<commit_message>
corregido enlace foundation en carta presentacion
</commit_message>
<xml_diff>
--- a/TarjetaPresentación.pptx
+++ b/TarjetaPresentación.pptx
@@ -197,7 +197,7 @@
           <a:p>
             <a:fld id="{7E60356A-0530-4333-9A88-1BB7BC2D6415}" type="datetimeFigureOut">
               <a:rPr lang="es-ES" smtClean="0"/>
-              <a:t>03/06/2025</a:t>
+              <a:t>04/06/2025</a:t>
             </a:fld>
             <a:endParaRPr lang="es-ES"/>
           </a:p>
@@ -832,7 +832,7 @@
           <a:p>
             <a:fld id="{E80C50CD-E178-4744-9B35-B2F624D6C5E9}" type="datetimeFigureOut">
               <a:rPr lang="en-US" smtClean="0"/>
-              <a:t>6/3/2025</a:t>
+              <a:t>6/4/2025</a:t>
             </a:fld>
             <a:endParaRPr lang="en-US"/>
           </a:p>
@@ -1030,7 +1030,7 @@
           <a:p>
             <a:fld id="{E80C50CD-E178-4744-9B35-B2F624D6C5E9}" type="datetimeFigureOut">
               <a:rPr lang="en-US" smtClean="0"/>
-              <a:t>6/3/2025</a:t>
+              <a:t>6/4/2025</a:t>
             </a:fld>
             <a:endParaRPr lang="en-US"/>
           </a:p>
@@ -1238,7 +1238,7 @@
           <a:p>
             <a:fld id="{E80C50CD-E178-4744-9B35-B2F624D6C5E9}" type="datetimeFigureOut">
               <a:rPr lang="en-US" smtClean="0"/>
-              <a:t>6/3/2025</a:t>
+              <a:t>6/4/2025</a:t>
             </a:fld>
             <a:endParaRPr lang="en-US"/>
           </a:p>
@@ -1488,7 +1488,7 @@
           <a:p>
             <a:fld id="{E80C50CD-E178-4744-9B35-B2F624D6C5E9}" type="datetimeFigureOut">
               <a:rPr lang="en-US" smtClean="0"/>
-              <a:t>6/3/2025</a:t>
+              <a:t>6/4/2025</a:t>
             </a:fld>
             <a:endParaRPr lang="en-US"/>
           </a:p>
@@ -1767,7 +1767,7 @@
           <a:p>
             <a:fld id="{E80C50CD-E178-4744-9B35-B2F624D6C5E9}" type="datetimeFigureOut">
               <a:rPr lang="en-US" smtClean="0"/>
-              <a:t>6/3/2025</a:t>
+              <a:t>6/4/2025</a:t>
             </a:fld>
             <a:endParaRPr lang="en-US"/>
           </a:p>
@@ -2084,7 +2084,7 @@
           <a:p>
             <a:fld id="{E80C50CD-E178-4744-9B35-B2F624D6C5E9}" type="datetimeFigureOut">
               <a:rPr lang="en-US" smtClean="0"/>
-              <a:t>6/3/2025</a:t>
+              <a:t>6/4/2025</a:t>
             </a:fld>
             <a:endParaRPr lang="en-US"/>
           </a:p>
@@ -2500,7 +2500,7 @@
           <a:p>
             <a:fld id="{E80C50CD-E178-4744-9B35-B2F624D6C5E9}" type="datetimeFigureOut">
               <a:rPr lang="en-US" smtClean="0"/>
-              <a:t>6/3/2025</a:t>
+              <a:t>6/4/2025</a:t>
             </a:fld>
             <a:endParaRPr lang="en-US"/>
           </a:p>
@@ -2641,7 +2641,7 @@
           <a:p>
             <a:fld id="{E80C50CD-E178-4744-9B35-B2F624D6C5E9}" type="datetimeFigureOut">
               <a:rPr lang="en-US" smtClean="0"/>
-              <a:t>6/3/2025</a:t>
+              <a:t>6/4/2025</a:t>
             </a:fld>
             <a:endParaRPr lang="en-US"/>
           </a:p>
@@ -2754,7 +2754,7 @@
           <a:p>
             <a:fld id="{E80C50CD-E178-4744-9B35-B2F624D6C5E9}" type="datetimeFigureOut">
               <a:rPr lang="en-US" smtClean="0"/>
-              <a:t>6/3/2025</a:t>
+              <a:t>6/4/2025</a:t>
             </a:fld>
             <a:endParaRPr lang="en-US"/>
           </a:p>
@@ -3071,7 +3071,7 @@
           <a:p>
             <a:fld id="{E80C50CD-E178-4744-9B35-B2F624D6C5E9}" type="datetimeFigureOut">
               <a:rPr lang="en-US" smtClean="0"/>
-              <a:t>6/3/2025</a:t>
+              <a:t>6/4/2025</a:t>
             </a:fld>
             <a:endParaRPr lang="en-US"/>
           </a:p>
@@ -3363,7 +3363,7 @@
           <a:p>
             <a:fld id="{E80C50CD-E178-4744-9B35-B2F624D6C5E9}" type="datetimeFigureOut">
               <a:rPr lang="en-US" smtClean="0"/>
-              <a:t>6/3/2025</a:t>
+              <a:t>6/4/2025</a:t>
             </a:fld>
             <a:endParaRPr lang="en-US"/>
           </a:p>
@@ -3603,7 +3603,7 @@
             <a:fld id="{E80C50CD-E178-4744-9B35-B2F624D6C5E9}" type="datetimeFigureOut">
               <a:rPr lang="en-US" smtClean="0"/>
               <a:pPr/>
-              <a:t>6/3/2025</a:t>
+              <a:t>6/4/2025</a:t>
             </a:fld>
             <a:endParaRPr lang="en-US"/>
           </a:p>
@@ -5409,7 +5409,7 @@
               </a:r>
               <a:r>
                 <a:rPr lang="es-ES" sz="1400" dirty="0">
-                  <a:hlinkClick r:id="rId5">
+                  <a:hlinkClick r:id="rId6">
                     <a:extLst>
                       <a:ext uri="{A12FA001-AC4F-418D-AE19-62706E023703}">
                         <ahyp:hlinkClr xmlns:ahyp="http://schemas.microsoft.com/office/drawing/2018/hyperlinkcolor" val="tx"/>
@@ -5417,7 +5417,7 @@
                     </a:extLst>
                   </a:hlinkClick>
                 </a:rPr>
-                <a:t>https://github.com/vrodriguezf/deepvats</a:t>
+                <a:t>https://github.com/vrodriguezf/deepvats/tree/develop-macu-feature-MPlots</a:t>
               </a:r>
               <a:r>
                 <a:rPr lang="es-ES" sz="1400" dirty="0"/>
@@ -5688,23 +5688,7 @@
               </a:r>
               <a:r>
                 <a:rPr lang="es-ES" sz="1400" dirty="0"/>
-                <a:t> </a:t>
-              </a:r>
-              <a:r>
-                <a:rPr lang="es-ES" sz="1400" dirty="0">
-                  <a:hlinkClick r:id="rId6">
-                    <a:extLst>
-                      <a:ext uri="{A12FA001-AC4F-418D-AE19-62706E023703}">
-                        <ahyp:hlinkClr xmlns:ahyp="http://schemas.microsoft.com/office/drawing/2018/hyperlinkcolor" val="tx"/>
-                      </a:ext>
-                    </a:extLst>
-                  </a:hlinkClick>
-                </a:rPr>
-                <a:t>https://github.com/vrodriguezf/deepvats/tree/develop-macu-feature-MPlots</a:t>
-              </a:r>
-              <a:r>
-                <a:rPr lang="es-ES" sz="1400" dirty="0"/>
-                <a:t> </a:t>
+                <a:t> https://github.com/misantamaria/deepvats-foundation/tree/paper</a:t>
               </a:r>
             </a:p>
           </p:txBody>
@@ -6963,1034 +6947,6 @@
       </p:sp>
       <p:grpSp>
         <p:nvGrpSpPr>
-          <p:cNvPr id="48" name="Group 47">
-            <a:extLst>
-              <a:ext uri="{FF2B5EF4-FFF2-40B4-BE49-F238E27FC236}">
-                <a16:creationId xmlns:a16="http://schemas.microsoft.com/office/drawing/2014/main" id="{D01BE9F1-B9A5-CB40-671E-337E0F319CEB}"/>
-              </a:ext>
-            </a:extLst>
-          </p:cNvPr>
-          <p:cNvGrpSpPr/>
-          <p:nvPr/>
-        </p:nvGrpSpPr>
-        <p:grpSpPr>
-          <a:xfrm>
-            <a:off x="566283" y="2939334"/>
-            <a:ext cx="2200050" cy="1873415"/>
-            <a:chOff x="334506" y="2530632"/>
-            <a:chExt cx="2200050" cy="1873415"/>
-          </a:xfrm>
-        </p:grpSpPr>
-        <p:pic>
-          <p:nvPicPr>
-            <p:cNvPr id="40" name="Picture 4" descr="GitHub Logomark">
-              <a:extLst>
-                <a:ext uri="{FF2B5EF4-FFF2-40B4-BE49-F238E27FC236}">
-                  <a16:creationId xmlns:a16="http://schemas.microsoft.com/office/drawing/2014/main" id="{96A59221-217E-B2B8-CB7A-4D96FDAAD6D5}"/>
-                </a:ext>
-              </a:extLst>
-            </p:cNvPr>
-            <p:cNvPicPr>
-              <a:picLocks noChangeAspect="1" noChangeArrowheads="1"/>
-            </p:cNvPicPr>
-            <p:nvPr/>
-          </p:nvPicPr>
-          <p:blipFill>
-            <a:blip r:embed="rId4">
-              <a:clrChange>
-                <a:clrFrom>
-                  <a:srgbClr val="FFFFFF"/>
-                </a:clrFrom>
-                <a:clrTo>
-                  <a:srgbClr val="FFFFFF">
-                    <a:alpha val="0"/>
-                  </a:srgbClr>
-                </a:clrTo>
-              </a:clrChange>
-              <a:extLst>
-                <a:ext uri="{28A0092B-C50C-407E-A947-70E740481C1C}">
-                  <a14:useLocalDpi xmlns:a14="http://schemas.microsoft.com/office/drawing/2010/main" val="0"/>
-                </a:ext>
-              </a:extLst>
-            </a:blip>
-            <a:srcRect/>
-            <a:stretch>
-              <a:fillRect/>
-            </a:stretch>
-          </p:blipFill>
-          <p:spPr bwMode="auto">
-            <a:xfrm>
-              <a:off x="368299" y="2530632"/>
-              <a:ext cx="314953" cy="314953"/>
-            </a:xfrm>
-            <a:prstGeom prst="rect">
-              <a:avLst/>
-            </a:prstGeom>
-            <a:noFill/>
-            <a:extLst>
-              <a:ext uri="{909E8E84-426E-40DD-AFC4-6F175D3DCCD1}">
-                <a14:hiddenFill xmlns:a14="http://schemas.microsoft.com/office/drawing/2010/main">
-                  <a:solidFill>
-                    <a:srgbClr val="FFFFFF"/>
-                  </a:solidFill>
-                </a14:hiddenFill>
-              </a:ext>
-            </a:extLst>
-          </p:spPr>
-        </p:pic>
-        <p:sp>
-          <p:nvSpPr>
-            <p:cNvPr id="41" name="Content Placeholder 2">
-              <a:extLst>
-                <a:ext uri="{FF2B5EF4-FFF2-40B4-BE49-F238E27FC236}">
-                  <a16:creationId xmlns:a16="http://schemas.microsoft.com/office/drawing/2014/main" id="{C3F2A1BD-B9F7-7C4D-0973-37A062AD3375}"/>
-                </a:ext>
-              </a:extLst>
-            </p:cNvPr>
-            <p:cNvSpPr txBox="1">
-              <a:spLocks/>
-            </p:cNvSpPr>
-            <p:nvPr/>
-          </p:nvSpPr>
-          <p:spPr>
-            <a:xfrm>
-              <a:off x="683252" y="2548405"/>
-              <a:ext cx="1851304" cy="297180"/>
-            </a:xfrm>
-            <a:prstGeom prst="rect">
-              <a:avLst/>
-            </a:prstGeom>
-          </p:spPr>
-          <p:txBody>
-            <a:bodyPr vert="horz" lIns="91440" tIns="45720" rIns="91440" bIns="45720" rtlCol="0">
-              <a:normAutofit fontScale="85000" lnSpcReduction="20000"/>
-            </a:bodyPr>
-            <a:lstStyle>
-              <a:lvl1pPr marL="228600" indent="-228600" algn="l" defTabSz="914400" rtl="0" eaLnBrk="1" latinLnBrk="0" hangingPunct="1">
-                <a:lnSpc>
-                  <a:spcPct val="110000"/>
-                </a:lnSpc>
-                <a:spcBef>
-                  <a:spcPts val="1000"/>
-                </a:spcBef>
-                <a:buFont typeface="Arial" panose="020B0604020202020204" pitchFamily="34" charset="0"/>
-                <a:buChar char="•"/>
-                <a:defRPr sz="1800" kern="1200">
-                  <a:solidFill>
-                    <a:schemeClr val="tx1"/>
-                  </a:solidFill>
-                  <a:latin typeface="+mn-lt"/>
-                  <a:ea typeface="+mn-ea"/>
-                  <a:cs typeface="+mn-cs"/>
-                </a:defRPr>
-              </a:lvl1pPr>
-              <a:lvl2pPr marL="685800" indent="-228600" algn="l" defTabSz="914400" rtl="0" eaLnBrk="1" latinLnBrk="0" hangingPunct="1">
-                <a:lnSpc>
-                  <a:spcPct val="110000"/>
-                </a:lnSpc>
-                <a:spcBef>
-                  <a:spcPts val="500"/>
-                </a:spcBef>
-                <a:buFont typeface="Arial" panose="020B0604020202020204" pitchFamily="34" charset="0"/>
-                <a:buChar char="•"/>
-                <a:defRPr sz="1600" kern="1200">
-                  <a:solidFill>
-                    <a:schemeClr val="tx1"/>
-                  </a:solidFill>
-                  <a:latin typeface="+mn-lt"/>
-                  <a:ea typeface="+mn-ea"/>
-                  <a:cs typeface="+mn-cs"/>
-                </a:defRPr>
-              </a:lvl2pPr>
-              <a:lvl3pPr marL="1143000" indent="-228600" algn="l" defTabSz="914400" rtl="0" eaLnBrk="1" latinLnBrk="0" hangingPunct="1">
-                <a:lnSpc>
-                  <a:spcPct val="110000"/>
-                </a:lnSpc>
-                <a:spcBef>
-                  <a:spcPts val="500"/>
-                </a:spcBef>
-                <a:buFont typeface="Arial" panose="020B0604020202020204" pitchFamily="34" charset="0"/>
-                <a:buChar char="•"/>
-                <a:defRPr sz="1400" kern="1200">
-                  <a:solidFill>
-                    <a:schemeClr val="tx1"/>
-                  </a:solidFill>
-                  <a:latin typeface="+mn-lt"/>
-                  <a:ea typeface="+mn-ea"/>
-                  <a:cs typeface="+mn-cs"/>
-                </a:defRPr>
-              </a:lvl3pPr>
-              <a:lvl4pPr marL="1600200" indent="-228600" algn="l" defTabSz="914400" rtl="0" eaLnBrk="1" latinLnBrk="0" hangingPunct="1">
-                <a:lnSpc>
-                  <a:spcPct val="110000"/>
-                </a:lnSpc>
-                <a:spcBef>
-                  <a:spcPts val="500"/>
-                </a:spcBef>
-                <a:buFont typeface="Arial" panose="020B0604020202020204" pitchFamily="34" charset="0"/>
-                <a:buChar char="•"/>
-                <a:defRPr sz="1200" kern="1200">
-                  <a:solidFill>
-                    <a:schemeClr val="tx1"/>
-                  </a:solidFill>
-                  <a:latin typeface="+mn-lt"/>
-                  <a:ea typeface="+mn-ea"/>
-                  <a:cs typeface="+mn-cs"/>
-                </a:defRPr>
-              </a:lvl4pPr>
-              <a:lvl5pPr marL="2057400" indent="-228600" algn="l" defTabSz="914400" rtl="0" eaLnBrk="1" latinLnBrk="0" hangingPunct="1">
-                <a:lnSpc>
-                  <a:spcPct val="110000"/>
-                </a:lnSpc>
-                <a:spcBef>
-                  <a:spcPts val="500"/>
-                </a:spcBef>
-                <a:buFont typeface="Arial" panose="020B0604020202020204" pitchFamily="34" charset="0"/>
-                <a:buChar char="•"/>
-                <a:defRPr sz="1200" kern="1200">
-                  <a:solidFill>
-                    <a:schemeClr val="tx1"/>
-                  </a:solidFill>
-                  <a:latin typeface="+mn-lt"/>
-                  <a:ea typeface="+mn-ea"/>
-                  <a:cs typeface="+mn-cs"/>
-                </a:defRPr>
-              </a:lvl5pPr>
-              <a:lvl6pPr marL="2514600" indent="-228600" algn="l" defTabSz="914400" rtl="0" eaLnBrk="1" latinLnBrk="0" hangingPunct="1">
-                <a:lnSpc>
-                  <a:spcPct val="90000"/>
-                </a:lnSpc>
-                <a:spcBef>
-                  <a:spcPts val="500"/>
-                </a:spcBef>
-                <a:buFont typeface="Arial" panose="020B0604020202020204" pitchFamily="34" charset="0"/>
-                <a:buChar char="•"/>
-                <a:defRPr sz="1800" kern="1200">
-                  <a:solidFill>
-                    <a:schemeClr val="tx1"/>
-                  </a:solidFill>
-                  <a:latin typeface="+mn-lt"/>
-                  <a:ea typeface="+mn-ea"/>
-                  <a:cs typeface="+mn-cs"/>
-                </a:defRPr>
-              </a:lvl6pPr>
-              <a:lvl7pPr marL="2971800" indent="-228600" algn="l" defTabSz="914400" rtl="0" eaLnBrk="1" latinLnBrk="0" hangingPunct="1">
-                <a:lnSpc>
-                  <a:spcPct val="90000"/>
-                </a:lnSpc>
-                <a:spcBef>
-                  <a:spcPts val="500"/>
-                </a:spcBef>
-                <a:buFont typeface="Arial" panose="020B0604020202020204" pitchFamily="34" charset="0"/>
-                <a:buChar char="•"/>
-                <a:defRPr sz="1800" kern="1200">
-                  <a:solidFill>
-                    <a:schemeClr val="tx1"/>
-                  </a:solidFill>
-                  <a:latin typeface="+mn-lt"/>
-                  <a:ea typeface="+mn-ea"/>
-                  <a:cs typeface="+mn-cs"/>
-                </a:defRPr>
-              </a:lvl7pPr>
-              <a:lvl8pPr marL="3429000" indent="-228600" algn="l" defTabSz="914400" rtl="0" eaLnBrk="1" latinLnBrk="0" hangingPunct="1">
-                <a:lnSpc>
-                  <a:spcPct val="90000"/>
-                </a:lnSpc>
-                <a:spcBef>
-                  <a:spcPts val="500"/>
-                </a:spcBef>
-                <a:buFont typeface="Arial" panose="020B0604020202020204" pitchFamily="34" charset="0"/>
-                <a:buChar char="•"/>
-                <a:defRPr sz="1800" kern="1200">
-                  <a:solidFill>
-                    <a:schemeClr val="tx1"/>
-                  </a:solidFill>
-                  <a:latin typeface="+mn-lt"/>
-                  <a:ea typeface="+mn-ea"/>
-                  <a:cs typeface="+mn-cs"/>
-                </a:defRPr>
-              </a:lvl8pPr>
-              <a:lvl9pPr marL="3886200" indent="-228600" algn="l" defTabSz="914400" rtl="0" eaLnBrk="1" latinLnBrk="0" hangingPunct="1">
-                <a:lnSpc>
-                  <a:spcPct val="90000"/>
-                </a:lnSpc>
-                <a:spcBef>
-                  <a:spcPts val="500"/>
-                </a:spcBef>
-                <a:buFont typeface="Arial" panose="020B0604020202020204" pitchFamily="34" charset="0"/>
-                <a:buChar char="•"/>
-                <a:defRPr sz="1800" kern="1200">
-                  <a:solidFill>
-                    <a:schemeClr val="tx1"/>
-                  </a:solidFill>
-                  <a:latin typeface="+mn-lt"/>
-                  <a:ea typeface="+mn-ea"/>
-                  <a:cs typeface="+mn-cs"/>
-                </a:defRPr>
-              </a:lvl9pPr>
-            </a:lstStyle>
-            <a:p>
-              <a:pPr marL="0" indent="0">
-                <a:buNone/>
-              </a:pPr>
-              <a:r>
-                <a:rPr lang="es-ES" dirty="0" err="1"/>
-                <a:t>misantamaria</a:t>
-              </a:r>
-              <a:endParaRPr lang="es-ES" sz="1400" dirty="0"/>
-            </a:p>
-          </p:txBody>
-        </p:sp>
-        <p:sp>
-          <p:nvSpPr>
-            <p:cNvPr id="42" name="Content Placeholder 2">
-              <a:extLst>
-                <a:ext uri="{FF2B5EF4-FFF2-40B4-BE49-F238E27FC236}">
-                  <a16:creationId xmlns:a16="http://schemas.microsoft.com/office/drawing/2014/main" id="{14BBAA76-FBBD-AECC-082B-0DF8F9FE194B}"/>
-                </a:ext>
-              </a:extLst>
-            </p:cNvPr>
-            <p:cNvSpPr txBox="1">
-              <a:spLocks/>
-            </p:cNvSpPr>
-            <p:nvPr/>
-          </p:nvSpPr>
-          <p:spPr>
-            <a:xfrm>
-              <a:off x="683252" y="2915051"/>
-              <a:ext cx="1851304" cy="297180"/>
-            </a:xfrm>
-            <a:prstGeom prst="rect">
-              <a:avLst/>
-            </a:prstGeom>
-          </p:spPr>
-          <p:txBody>
-            <a:bodyPr vert="horz" lIns="91440" tIns="45720" rIns="91440" bIns="45720" rtlCol="0">
-              <a:normAutofit fontScale="85000" lnSpcReduction="20000"/>
-            </a:bodyPr>
-            <a:lstStyle>
-              <a:lvl1pPr marL="228600" indent="-228600" algn="l" defTabSz="914400" rtl="0" eaLnBrk="1" latinLnBrk="0" hangingPunct="1">
-                <a:lnSpc>
-                  <a:spcPct val="110000"/>
-                </a:lnSpc>
-                <a:spcBef>
-                  <a:spcPts val="1000"/>
-                </a:spcBef>
-                <a:buFont typeface="Arial" panose="020B0604020202020204" pitchFamily="34" charset="0"/>
-                <a:buChar char="•"/>
-                <a:defRPr sz="1800" kern="1200">
-                  <a:solidFill>
-                    <a:schemeClr val="tx1"/>
-                  </a:solidFill>
-                  <a:latin typeface="+mn-lt"/>
-                  <a:ea typeface="+mn-ea"/>
-                  <a:cs typeface="+mn-cs"/>
-                </a:defRPr>
-              </a:lvl1pPr>
-              <a:lvl2pPr marL="685800" indent="-228600" algn="l" defTabSz="914400" rtl="0" eaLnBrk="1" latinLnBrk="0" hangingPunct="1">
-                <a:lnSpc>
-                  <a:spcPct val="110000"/>
-                </a:lnSpc>
-                <a:spcBef>
-                  <a:spcPts val="500"/>
-                </a:spcBef>
-                <a:buFont typeface="Arial" panose="020B0604020202020204" pitchFamily="34" charset="0"/>
-                <a:buChar char="•"/>
-                <a:defRPr sz="1600" kern="1200">
-                  <a:solidFill>
-                    <a:schemeClr val="tx1"/>
-                  </a:solidFill>
-                  <a:latin typeface="+mn-lt"/>
-                  <a:ea typeface="+mn-ea"/>
-                  <a:cs typeface="+mn-cs"/>
-                </a:defRPr>
-              </a:lvl2pPr>
-              <a:lvl3pPr marL="1143000" indent="-228600" algn="l" defTabSz="914400" rtl="0" eaLnBrk="1" latinLnBrk="0" hangingPunct="1">
-                <a:lnSpc>
-                  <a:spcPct val="110000"/>
-                </a:lnSpc>
-                <a:spcBef>
-                  <a:spcPts val="500"/>
-                </a:spcBef>
-                <a:buFont typeface="Arial" panose="020B0604020202020204" pitchFamily="34" charset="0"/>
-                <a:buChar char="•"/>
-                <a:defRPr sz="1400" kern="1200">
-                  <a:solidFill>
-                    <a:schemeClr val="tx1"/>
-                  </a:solidFill>
-                  <a:latin typeface="+mn-lt"/>
-                  <a:ea typeface="+mn-ea"/>
-                  <a:cs typeface="+mn-cs"/>
-                </a:defRPr>
-              </a:lvl3pPr>
-              <a:lvl4pPr marL="1600200" indent="-228600" algn="l" defTabSz="914400" rtl="0" eaLnBrk="1" latinLnBrk="0" hangingPunct="1">
-                <a:lnSpc>
-                  <a:spcPct val="110000"/>
-                </a:lnSpc>
-                <a:spcBef>
-                  <a:spcPts val="500"/>
-                </a:spcBef>
-                <a:buFont typeface="Arial" panose="020B0604020202020204" pitchFamily="34" charset="0"/>
-                <a:buChar char="•"/>
-                <a:defRPr sz="1200" kern="1200">
-                  <a:solidFill>
-                    <a:schemeClr val="tx1"/>
-                  </a:solidFill>
-                  <a:latin typeface="+mn-lt"/>
-                  <a:ea typeface="+mn-ea"/>
-                  <a:cs typeface="+mn-cs"/>
-                </a:defRPr>
-              </a:lvl4pPr>
-              <a:lvl5pPr marL="2057400" indent="-228600" algn="l" defTabSz="914400" rtl="0" eaLnBrk="1" latinLnBrk="0" hangingPunct="1">
-                <a:lnSpc>
-                  <a:spcPct val="110000"/>
-                </a:lnSpc>
-                <a:spcBef>
-                  <a:spcPts val="500"/>
-                </a:spcBef>
-                <a:buFont typeface="Arial" panose="020B0604020202020204" pitchFamily="34" charset="0"/>
-                <a:buChar char="•"/>
-                <a:defRPr sz="1200" kern="1200">
-                  <a:solidFill>
-                    <a:schemeClr val="tx1"/>
-                  </a:solidFill>
-                  <a:latin typeface="+mn-lt"/>
-                  <a:ea typeface="+mn-ea"/>
-                  <a:cs typeface="+mn-cs"/>
-                </a:defRPr>
-              </a:lvl5pPr>
-              <a:lvl6pPr marL="2514600" indent="-228600" algn="l" defTabSz="914400" rtl="0" eaLnBrk="1" latinLnBrk="0" hangingPunct="1">
-                <a:lnSpc>
-                  <a:spcPct val="90000"/>
-                </a:lnSpc>
-                <a:spcBef>
-                  <a:spcPts val="500"/>
-                </a:spcBef>
-                <a:buFont typeface="Arial" panose="020B0604020202020204" pitchFamily="34" charset="0"/>
-                <a:buChar char="•"/>
-                <a:defRPr sz="1800" kern="1200">
-                  <a:solidFill>
-                    <a:schemeClr val="tx1"/>
-                  </a:solidFill>
-                  <a:latin typeface="+mn-lt"/>
-                  <a:ea typeface="+mn-ea"/>
-                  <a:cs typeface="+mn-cs"/>
-                </a:defRPr>
-              </a:lvl6pPr>
-              <a:lvl7pPr marL="2971800" indent="-228600" algn="l" defTabSz="914400" rtl="0" eaLnBrk="1" latinLnBrk="0" hangingPunct="1">
-                <a:lnSpc>
-                  <a:spcPct val="90000"/>
-                </a:lnSpc>
-                <a:spcBef>
-                  <a:spcPts val="500"/>
-                </a:spcBef>
-                <a:buFont typeface="Arial" panose="020B0604020202020204" pitchFamily="34" charset="0"/>
-                <a:buChar char="•"/>
-                <a:defRPr sz="1800" kern="1200">
-                  <a:solidFill>
-                    <a:schemeClr val="tx1"/>
-                  </a:solidFill>
-                  <a:latin typeface="+mn-lt"/>
-                  <a:ea typeface="+mn-ea"/>
-                  <a:cs typeface="+mn-cs"/>
-                </a:defRPr>
-              </a:lvl7pPr>
-              <a:lvl8pPr marL="3429000" indent="-228600" algn="l" defTabSz="914400" rtl="0" eaLnBrk="1" latinLnBrk="0" hangingPunct="1">
-                <a:lnSpc>
-                  <a:spcPct val="90000"/>
-                </a:lnSpc>
-                <a:spcBef>
-                  <a:spcPts val="500"/>
-                </a:spcBef>
-                <a:buFont typeface="Arial" panose="020B0604020202020204" pitchFamily="34" charset="0"/>
-                <a:buChar char="•"/>
-                <a:defRPr sz="1800" kern="1200">
-                  <a:solidFill>
-                    <a:schemeClr val="tx1"/>
-                  </a:solidFill>
-                  <a:latin typeface="+mn-lt"/>
-                  <a:ea typeface="+mn-ea"/>
-                  <a:cs typeface="+mn-cs"/>
-                </a:defRPr>
-              </a:lvl8pPr>
-              <a:lvl9pPr marL="3886200" indent="-228600" algn="l" defTabSz="914400" rtl="0" eaLnBrk="1" latinLnBrk="0" hangingPunct="1">
-                <a:lnSpc>
-                  <a:spcPct val="90000"/>
-                </a:lnSpc>
-                <a:spcBef>
-                  <a:spcPts val="500"/>
-                </a:spcBef>
-                <a:buFont typeface="Arial" panose="020B0604020202020204" pitchFamily="34" charset="0"/>
-                <a:buChar char="•"/>
-                <a:defRPr sz="1800" kern="1200">
-                  <a:solidFill>
-                    <a:schemeClr val="tx1"/>
-                  </a:solidFill>
-                  <a:latin typeface="+mn-lt"/>
-                  <a:ea typeface="+mn-ea"/>
-                  <a:cs typeface="+mn-cs"/>
-                </a:defRPr>
-              </a:lvl9pPr>
-            </a:lstStyle>
-            <a:p>
-              <a:pPr marL="0" indent="0">
-                <a:buNone/>
-              </a:pPr>
-              <a:r>
-                <a:rPr lang="es-ES" dirty="0" err="1"/>
-                <a:t>misantamaria</a:t>
-              </a:r>
-              <a:endParaRPr lang="es-ES" sz="1400" dirty="0"/>
-            </a:p>
-          </p:txBody>
-        </p:sp>
-        <p:pic>
-          <p:nvPicPr>
-            <p:cNvPr id="43" name="Picture 6" descr="Brand assets - Hugging Face">
-              <a:extLst>
-                <a:ext uri="{FF2B5EF4-FFF2-40B4-BE49-F238E27FC236}">
-                  <a16:creationId xmlns:a16="http://schemas.microsoft.com/office/drawing/2014/main" id="{88846DED-E219-DFBA-0AD2-9983B24CE0C4}"/>
-                </a:ext>
-              </a:extLst>
-            </p:cNvPr>
-            <p:cNvPicPr>
-              <a:picLocks noChangeAspect="1" noChangeArrowheads="1"/>
-            </p:cNvPicPr>
-            <p:nvPr/>
-          </p:nvPicPr>
-          <p:blipFill>
-            <a:blip r:embed="rId7">
-              <a:clrChange>
-                <a:clrFrom>
-                  <a:srgbClr val="FFFFFF"/>
-                </a:clrFrom>
-                <a:clrTo>
-                  <a:srgbClr val="FFFFFF">
-                    <a:alpha val="0"/>
-                  </a:srgbClr>
-                </a:clrTo>
-              </a:clrChange>
-              <a:extLst>
-                <a:ext uri="{28A0092B-C50C-407E-A947-70E740481C1C}">
-                  <a14:useLocalDpi xmlns:a14="http://schemas.microsoft.com/office/drawing/2010/main" val="0"/>
-                </a:ext>
-              </a:extLst>
-            </a:blip>
-            <a:srcRect/>
-            <a:stretch>
-              <a:fillRect/>
-            </a:stretch>
-          </p:blipFill>
-          <p:spPr bwMode="auto">
-            <a:xfrm>
-              <a:off x="366605" y="2913869"/>
-              <a:ext cx="314953" cy="291646"/>
-            </a:xfrm>
-            <a:prstGeom prst="rect">
-              <a:avLst/>
-            </a:prstGeom>
-            <a:noFill/>
-            <a:extLst>
-              <a:ext uri="{909E8E84-426E-40DD-AFC4-6F175D3DCCD1}">
-                <a14:hiddenFill xmlns:a14="http://schemas.microsoft.com/office/drawing/2010/main">
-                  <a:solidFill>
-                    <a:srgbClr val="FFFFFF"/>
-                  </a:solidFill>
-                </a14:hiddenFill>
-              </a:ext>
-            </a:extLst>
-          </p:spPr>
-        </p:pic>
-        <p:pic>
-          <p:nvPicPr>
-            <p:cNvPr id="45" name="Graphic 44">
-              <a:extLst>
-                <a:ext uri="{FF2B5EF4-FFF2-40B4-BE49-F238E27FC236}">
-                  <a16:creationId xmlns:a16="http://schemas.microsoft.com/office/drawing/2014/main" id="{98CA59E0-6EEF-78A6-912D-E694914CCE08}"/>
-                </a:ext>
-              </a:extLst>
-            </p:cNvPr>
-            <p:cNvPicPr>
-              <a:picLocks noChangeAspect="1"/>
-            </p:cNvPicPr>
-            <p:nvPr/>
-          </p:nvPicPr>
-          <p:blipFill>
-            <a:blip r:embed="rId14">
-              <a:extLst>
-                <a:ext uri="{96DAC541-7B7A-43D3-8B79-37D633B846F1}">
-                  <asvg:svgBlip xmlns:asvg="http://schemas.microsoft.com/office/drawing/2016/SVG/main" r:embed="rId15"/>
-                </a:ext>
-              </a:extLst>
-            </a:blip>
-            <a:stretch>
-              <a:fillRect/>
-            </a:stretch>
-          </p:blipFill>
-          <p:spPr>
-            <a:xfrm>
-              <a:off x="334506" y="3399462"/>
-              <a:ext cx="379150" cy="379150"/>
-            </a:xfrm>
-            <a:prstGeom prst="rect">
-              <a:avLst/>
-            </a:prstGeom>
-          </p:spPr>
-        </p:pic>
-        <p:sp>
-          <p:nvSpPr>
-            <p:cNvPr id="46" name="Content Placeholder 2">
-              <a:extLst>
-                <a:ext uri="{FF2B5EF4-FFF2-40B4-BE49-F238E27FC236}">
-                  <a16:creationId xmlns:a16="http://schemas.microsoft.com/office/drawing/2014/main" id="{288ED14F-2A8C-AA9A-46A9-B1FA39D7B373}"/>
-                </a:ext>
-              </a:extLst>
-            </p:cNvPr>
-            <p:cNvSpPr txBox="1">
-              <a:spLocks/>
-            </p:cNvSpPr>
-            <p:nvPr/>
-          </p:nvSpPr>
-          <p:spPr>
-            <a:xfrm>
-              <a:off x="683252" y="3314321"/>
-              <a:ext cx="1851304" cy="297180"/>
-            </a:xfrm>
-            <a:prstGeom prst="rect">
-              <a:avLst/>
-            </a:prstGeom>
-          </p:spPr>
-          <p:txBody>
-            <a:bodyPr vert="horz" lIns="91440" tIns="45720" rIns="91440" bIns="45720" rtlCol="0">
-              <a:noAutofit/>
-            </a:bodyPr>
-            <a:lstStyle>
-              <a:lvl1pPr marL="228600" indent="-228600" algn="l" defTabSz="914400" rtl="0" eaLnBrk="1" latinLnBrk="0" hangingPunct="1">
-                <a:lnSpc>
-                  <a:spcPct val="110000"/>
-                </a:lnSpc>
-                <a:spcBef>
-                  <a:spcPts val="1000"/>
-                </a:spcBef>
-                <a:buFont typeface="Arial" panose="020B0604020202020204" pitchFamily="34" charset="0"/>
-                <a:buChar char="•"/>
-                <a:defRPr sz="1800" kern="1200">
-                  <a:solidFill>
-                    <a:schemeClr val="tx1"/>
-                  </a:solidFill>
-                  <a:latin typeface="+mn-lt"/>
-                  <a:ea typeface="+mn-ea"/>
-                  <a:cs typeface="+mn-cs"/>
-                </a:defRPr>
-              </a:lvl1pPr>
-              <a:lvl2pPr marL="685800" indent="-228600" algn="l" defTabSz="914400" rtl="0" eaLnBrk="1" latinLnBrk="0" hangingPunct="1">
-                <a:lnSpc>
-                  <a:spcPct val="110000"/>
-                </a:lnSpc>
-                <a:spcBef>
-                  <a:spcPts val="500"/>
-                </a:spcBef>
-                <a:buFont typeface="Arial" panose="020B0604020202020204" pitchFamily="34" charset="0"/>
-                <a:buChar char="•"/>
-                <a:defRPr sz="1600" kern="1200">
-                  <a:solidFill>
-                    <a:schemeClr val="tx1"/>
-                  </a:solidFill>
-                  <a:latin typeface="+mn-lt"/>
-                  <a:ea typeface="+mn-ea"/>
-                  <a:cs typeface="+mn-cs"/>
-                </a:defRPr>
-              </a:lvl2pPr>
-              <a:lvl3pPr marL="1143000" indent="-228600" algn="l" defTabSz="914400" rtl="0" eaLnBrk="1" latinLnBrk="0" hangingPunct="1">
-                <a:lnSpc>
-                  <a:spcPct val="110000"/>
-                </a:lnSpc>
-                <a:spcBef>
-                  <a:spcPts val="500"/>
-                </a:spcBef>
-                <a:buFont typeface="Arial" panose="020B0604020202020204" pitchFamily="34" charset="0"/>
-                <a:buChar char="•"/>
-                <a:defRPr sz="1400" kern="1200">
-                  <a:solidFill>
-                    <a:schemeClr val="tx1"/>
-                  </a:solidFill>
-                  <a:latin typeface="+mn-lt"/>
-                  <a:ea typeface="+mn-ea"/>
-                  <a:cs typeface="+mn-cs"/>
-                </a:defRPr>
-              </a:lvl3pPr>
-              <a:lvl4pPr marL="1600200" indent="-228600" algn="l" defTabSz="914400" rtl="0" eaLnBrk="1" latinLnBrk="0" hangingPunct="1">
-                <a:lnSpc>
-                  <a:spcPct val="110000"/>
-                </a:lnSpc>
-                <a:spcBef>
-                  <a:spcPts val="500"/>
-                </a:spcBef>
-                <a:buFont typeface="Arial" panose="020B0604020202020204" pitchFamily="34" charset="0"/>
-                <a:buChar char="•"/>
-                <a:defRPr sz="1200" kern="1200">
-                  <a:solidFill>
-                    <a:schemeClr val="tx1"/>
-                  </a:solidFill>
-                  <a:latin typeface="+mn-lt"/>
-                  <a:ea typeface="+mn-ea"/>
-                  <a:cs typeface="+mn-cs"/>
-                </a:defRPr>
-              </a:lvl4pPr>
-              <a:lvl5pPr marL="2057400" indent="-228600" algn="l" defTabSz="914400" rtl="0" eaLnBrk="1" latinLnBrk="0" hangingPunct="1">
-                <a:lnSpc>
-                  <a:spcPct val="110000"/>
-                </a:lnSpc>
-                <a:spcBef>
-                  <a:spcPts val="500"/>
-                </a:spcBef>
-                <a:buFont typeface="Arial" panose="020B0604020202020204" pitchFamily="34" charset="0"/>
-                <a:buChar char="•"/>
-                <a:defRPr sz="1200" kern="1200">
-                  <a:solidFill>
-                    <a:schemeClr val="tx1"/>
-                  </a:solidFill>
-                  <a:latin typeface="+mn-lt"/>
-                  <a:ea typeface="+mn-ea"/>
-                  <a:cs typeface="+mn-cs"/>
-                </a:defRPr>
-              </a:lvl5pPr>
-              <a:lvl6pPr marL="2514600" indent="-228600" algn="l" defTabSz="914400" rtl="0" eaLnBrk="1" latinLnBrk="0" hangingPunct="1">
-                <a:lnSpc>
-                  <a:spcPct val="90000"/>
-                </a:lnSpc>
-                <a:spcBef>
-                  <a:spcPts val="500"/>
-                </a:spcBef>
-                <a:buFont typeface="Arial" panose="020B0604020202020204" pitchFamily="34" charset="0"/>
-                <a:buChar char="•"/>
-                <a:defRPr sz="1800" kern="1200">
-                  <a:solidFill>
-                    <a:schemeClr val="tx1"/>
-                  </a:solidFill>
-                  <a:latin typeface="+mn-lt"/>
-                  <a:ea typeface="+mn-ea"/>
-                  <a:cs typeface="+mn-cs"/>
-                </a:defRPr>
-              </a:lvl6pPr>
-              <a:lvl7pPr marL="2971800" indent="-228600" algn="l" defTabSz="914400" rtl="0" eaLnBrk="1" latinLnBrk="0" hangingPunct="1">
-                <a:lnSpc>
-                  <a:spcPct val="90000"/>
-                </a:lnSpc>
-                <a:spcBef>
-                  <a:spcPts val="500"/>
-                </a:spcBef>
-                <a:buFont typeface="Arial" panose="020B0604020202020204" pitchFamily="34" charset="0"/>
-                <a:buChar char="•"/>
-                <a:defRPr sz="1800" kern="1200">
-                  <a:solidFill>
-                    <a:schemeClr val="tx1"/>
-                  </a:solidFill>
-                  <a:latin typeface="+mn-lt"/>
-                  <a:ea typeface="+mn-ea"/>
-                  <a:cs typeface="+mn-cs"/>
-                </a:defRPr>
-              </a:lvl7pPr>
-              <a:lvl8pPr marL="3429000" indent="-228600" algn="l" defTabSz="914400" rtl="0" eaLnBrk="1" latinLnBrk="0" hangingPunct="1">
-                <a:lnSpc>
-                  <a:spcPct val="90000"/>
-                </a:lnSpc>
-                <a:spcBef>
-                  <a:spcPts val="500"/>
-                </a:spcBef>
-                <a:buFont typeface="Arial" panose="020B0604020202020204" pitchFamily="34" charset="0"/>
-                <a:buChar char="•"/>
-                <a:defRPr sz="1800" kern="1200">
-                  <a:solidFill>
-                    <a:schemeClr val="tx1"/>
-                  </a:solidFill>
-                  <a:latin typeface="+mn-lt"/>
-                  <a:ea typeface="+mn-ea"/>
-                  <a:cs typeface="+mn-cs"/>
-                </a:defRPr>
-              </a:lvl8pPr>
-              <a:lvl9pPr marL="3886200" indent="-228600" algn="l" defTabSz="914400" rtl="0" eaLnBrk="1" latinLnBrk="0" hangingPunct="1">
-                <a:lnSpc>
-                  <a:spcPct val="90000"/>
-                </a:lnSpc>
-                <a:spcBef>
-                  <a:spcPts val="500"/>
-                </a:spcBef>
-                <a:buFont typeface="Arial" panose="020B0604020202020204" pitchFamily="34" charset="0"/>
-                <a:buChar char="•"/>
-                <a:defRPr sz="1800" kern="1200">
-                  <a:solidFill>
-                    <a:schemeClr val="tx1"/>
-                  </a:solidFill>
-                  <a:latin typeface="+mn-lt"/>
-                  <a:ea typeface="+mn-ea"/>
-                  <a:cs typeface="+mn-cs"/>
-                </a:defRPr>
-              </a:lvl9pPr>
-            </a:lstStyle>
-            <a:p>
-              <a:pPr marL="0" indent="0">
-                <a:buNone/>
-              </a:pPr>
-              <a:r>
-                <a:rPr lang="es-ES" sz="1300" dirty="0"/>
-                <a:t>Inmaculada Santamaria-Valenzuela</a:t>
-              </a:r>
-            </a:p>
-          </p:txBody>
-        </p:sp>
-        <p:sp>
-          <p:nvSpPr>
-            <p:cNvPr id="47" name="Content Placeholder 2">
-              <a:extLst>
-                <a:ext uri="{FF2B5EF4-FFF2-40B4-BE49-F238E27FC236}">
-                  <a16:creationId xmlns:a16="http://schemas.microsoft.com/office/drawing/2014/main" id="{3C0BFD95-5159-B91D-274E-57776F54F496}"/>
-                </a:ext>
-              </a:extLst>
-            </p:cNvPr>
-            <p:cNvSpPr txBox="1">
-              <a:spLocks/>
-            </p:cNvSpPr>
-            <p:nvPr/>
-          </p:nvSpPr>
-          <p:spPr>
-            <a:xfrm>
-              <a:off x="678183" y="3937863"/>
-              <a:ext cx="1851304" cy="297180"/>
-            </a:xfrm>
-            <a:prstGeom prst="rect">
-              <a:avLst/>
-            </a:prstGeom>
-          </p:spPr>
-          <p:txBody>
-            <a:bodyPr vert="horz" lIns="91440" tIns="45720" rIns="91440" bIns="45720" rtlCol="0">
-              <a:noAutofit/>
-            </a:bodyPr>
-            <a:lstStyle>
-              <a:lvl1pPr marL="228600" indent="-228600" algn="l" defTabSz="914400" rtl="0" eaLnBrk="1" latinLnBrk="0" hangingPunct="1">
-                <a:lnSpc>
-                  <a:spcPct val="110000"/>
-                </a:lnSpc>
-                <a:spcBef>
-                  <a:spcPts val="1000"/>
-                </a:spcBef>
-                <a:buFont typeface="Arial" panose="020B0604020202020204" pitchFamily="34" charset="0"/>
-                <a:buChar char="•"/>
-                <a:defRPr sz="1800" kern="1200">
-                  <a:solidFill>
-                    <a:schemeClr val="tx1"/>
-                  </a:solidFill>
-                  <a:latin typeface="+mn-lt"/>
-                  <a:ea typeface="+mn-ea"/>
-                  <a:cs typeface="+mn-cs"/>
-                </a:defRPr>
-              </a:lvl1pPr>
-              <a:lvl2pPr marL="685800" indent="-228600" algn="l" defTabSz="914400" rtl="0" eaLnBrk="1" latinLnBrk="0" hangingPunct="1">
-                <a:lnSpc>
-                  <a:spcPct val="110000"/>
-                </a:lnSpc>
-                <a:spcBef>
-                  <a:spcPts val="500"/>
-                </a:spcBef>
-                <a:buFont typeface="Arial" panose="020B0604020202020204" pitchFamily="34" charset="0"/>
-                <a:buChar char="•"/>
-                <a:defRPr sz="1600" kern="1200">
-                  <a:solidFill>
-                    <a:schemeClr val="tx1"/>
-                  </a:solidFill>
-                  <a:latin typeface="+mn-lt"/>
-                  <a:ea typeface="+mn-ea"/>
-                  <a:cs typeface="+mn-cs"/>
-                </a:defRPr>
-              </a:lvl2pPr>
-              <a:lvl3pPr marL="1143000" indent="-228600" algn="l" defTabSz="914400" rtl="0" eaLnBrk="1" latinLnBrk="0" hangingPunct="1">
-                <a:lnSpc>
-                  <a:spcPct val="110000"/>
-                </a:lnSpc>
-                <a:spcBef>
-                  <a:spcPts val="500"/>
-                </a:spcBef>
-                <a:buFont typeface="Arial" panose="020B0604020202020204" pitchFamily="34" charset="0"/>
-                <a:buChar char="•"/>
-                <a:defRPr sz="1400" kern="1200">
-                  <a:solidFill>
-                    <a:schemeClr val="tx1"/>
-                  </a:solidFill>
-                  <a:latin typeface="+mn-lt"/>
-                  <a:ea typeface="+mn-ea"/>
-                  <a:cs typeface="+mn-cs"/>
-                </a:defRPr>
-              </a:lvl3pPr>
-              <a:lvl4pPr marL="1600200" indent="-228600" algn="l" defTabSz="914400" rtl="0" eaLnBrk="1" latinLnBrk="0" hangingPunct="1">
-                <a:lnSpc>
-                  <a:spcPct val="110000"/>
-                </a:lnSpc>
-                <a:spcBef>
-                  <a:spcPts val="500"/>
-                </a:spcBef>
-                <a:buFont typeface="Arial" panose="020B0604020202020204" pitchFamily="34" charset="0"/>
-                <a:buChar char="•"/>
-                <a:defRPr sz="1200" kern="1200">
-                  <a:solidFill>
-                    <a:schemeClr val="tx1"/>
-                  </a:solidFill>
-                  <a:latin typeface="+mn-lt"/>
-                  <a:ea typeface="+mn-ea"/>
-                  <a:cs typeface="+mn-cs"/>
-                </a:defRPr>
-              </a:lvl4pPr>
-              <a:lvl5pPr marL="2057400" indent="-228600" algn="l" defTabSz="914400" rtl="0" eaLnBrk="1" latinLnBrk="0" hangingPunct="1">
-                <a:lnSpc>
-                  <a:spcPct val="110000"/>
-                </a:lnSpc>
-                <a:spcBef>
-                  <a:spcPts val="500"/>
-                </a:spcBef>
-                <a:buFont typeface="Arial" panose="020B0604020202020204" pitchFamily="34" charset="0"/>
-                <a:buChar char="•"/>
-                <a:defRPr sz="1200" kern="1200">
-                  <a:solidFill>
-                    <a:schemeClr val="tx1"/>
-                  </a:solidFill>
-                  <a:latin typeface="+mn-lt"/>
-                  <a:ea typeface="+mn-ea"/>
-                  <a:cs typeface="+mn-cs"/>
-                </a:defRPr>
-              </a:lvl5pPr>
-              <a:lvl6pPr marL="2514600" indent="-228600" algn="l" defTabSz="914400" rtl="0" eaLnBrk="1" latinLnBrk="0" hangingPunct="1">
-                <a:lnSpc>
-                  <a:spcPct val="90000"/>
-                </a:lnSpc>
-                <a:spcBef>
-                  <a:spcPts val="500"/>
-                </a:spcBef>
-                <a:buFont typeface="Arial" panose="020B0604020202020204" pitchFamily="34" charset="0"/>
-                <a:buChar char="•"/>
-                <a:defRPr sz="1800" kern="1200">
-                  <a:solidFill>
-                    <a:schemeClr val="tx1"/>
-                  </a:solidFill>
-                  <a:latin typeface="+mn-lt"/>
-                  <a:ea typeface="+mn-ea"/>
-                  <a:cs typeface="+mn-cs"/>
-                </a:defRPr>
-              </a:lvl6pPr>
-              <a:lvl7pPr marL="2971800" indent="-228600" algn="l" defTabSz="914400" rtl="0" eaLnBrk="1" latinLnBrk="0" hangingPunct="1">
-                <a:lnSpc>
-                  <a:spcPct val="90000"/>
-                </a:lnSpc>
-                <a:spcBef>
-                  <a:spcPts val="500"/>
-                </a:spcBef>
-                <a:buFont typeface="Arial" panose="020B0604020202020204" pitchFamily="34" charset="0"/>
-                <a:buChar char="•"/>
-                <a:defRPr sz="1800" kern="1200">
-                  <a:solidFill>
-                    <a:schemeClr val="tx1"/>
-                  </a:solidFill>
-                  <a:latin typeface="+mn-lt"/>
-                  <a:ea typeface="+mn-ea"/>
-                  <a:cs typeface="+mn-cs"/>
-                </a:defRPr>
-              </a:lvl7pPr>
-              <a:lvl8pPr marL="3429000" indent="-228600" algn="l" defTabSz="914400" rtl="0" eaLnBrk="1" latinLnBrk="0" hangingPunct="1">
-                <a:lnSpc>
-                  <a:spcPct val="90000"/>
-                </a:lnSpc>
-                <a:spcBef>
-                  <a:spcPts val="500"/>
-                </a:spcBef>
-                <a:buFont typeface="Arial" panose="020B0604020202020204" pitchFamily="34" charset="0"/>
-                <a:buChar char="•"/>
-                <a:defRPr sz="1800" kern="1200">
-                  <a:solidFill>
-                    <a:schemeClr val="tx1"/>
-                  </a:solidFill>
-                  <a:latin typeface="+mn-lt"/>
-                  <a:ea typeface="+mn-ea"/>
-                  <a:cs typeface="+mn-cs"/>
-                </a:defRPr>
-              </a:lvl8pPr>
-              <a:lvl9pPr marL="3886200" indent="-228600" algn="l" defTabSz="914400" rtl="0" eaLnBrk="1" latinLnBrk="0" hangingPunct="1">
-                <a:lnSpc>
-                  <a:spcPct val="90000"/>
-                </a:lnSpc>
-                <a:spcBef>
-                  <a:spcPts val="500"/>
-                </a:spcBef>
-                <a:buFont typeface="Arial" panose="020B0604020202020204" pitchFamily="34" charset="0"/>
-                <a:buChar char="•"/>
-                <a:defRPr sz="1800" kern="1200">
-                  <a:solidFill>
-                    <a:schemeClr val="tx1"/>
-                  </a:solidFill>
-                  <a:latin typeface="+mn-lt"/>
-                  <a:ea typeface="+mn-ea"/>
-                  <a:cs typeface="+mn-cs"/>
-                </a:defRPr>
-              </a:lvl9pPr>
-            </a:lstStyle>
-            <a:p>
-              <a:pPr marL="0" indent="0">
-                <a:buNone/>
-              </a:pPr>
-              <a:r>
-                <a:rPr lang="es-ES" sz="1300" dirty="0"/>
-                <a:t>Inmaculada Santamaria Valenzuela</a:t>
-              </a:r>
-            </a:p>
-          </p:txBody>
-        </p:sp>
-        <p:pic>
-          <p:nvPicPr>
-            <p:cNvPr id="2056" name="Picture 8">
-              <a:extLst>
-                <a:ext uri="{FF2B5EF4-FFF2-40B4-BE49-F238E27FC236}">
-                  <a16:creationId xmlns:a16="http://schemas.microsoft.com/office/drawing/2014/main" id="{93820437-8CFD-CFA4-2CB0-25A4399F0C9C}"/>
-                </a:ext>
-              </a:extLst>
-            </p:cNvPr>
-            <p:cNvPicPr>
-              <a:picLocks noChangeAspect="1" noChangeArrowheads="1"/>
-            </p:cNvPicPr>
-            <p:nvPr/>
-          </p:nvPicPr>
-          <p:blipFill>
-            <a:blip r:embed="rId16">
-              <a:extLst>
-                <a:ext uri="{28A0092B-C50C-407E-A947-70E740481C1C}">
-                  <a14:useLocalDpi xmlns:a14="http://schemas.microsoft.com/office/drawing/2010/main" val="0"/>
-                </a:ext>
-              </a:extLst>
-            </a:blip>
-            <a:srcRect/>
-            <a:stretch>
-              <a:fillRect/>
-            </a:stretch>
-          </p:blipFill>
-          <p:spPr bwMode="auto">
-            <a:xfrm>
-              <a:off x="334506" y="4024897"/>
-              <a:ext cx="379150" cy="379150"/>
-            </a:xfrm>
-            <a:prstGeom prst="rect">
-              <a:avLst/>
-            </a:prstGeom>
-            <a:noFill/>
-            <a:extLst>
-              <a:ext uri="{909E8E84-426E-40DD-AFC4-6F175D3DCCD1}">
-                <a14:hiddenFill xmlns:a14="http://schemas.microsoft.com/office/drawing/2010/main">
-                  <a:solidFill>
-                    <a:srgbClr val="FFFFFF"/>
-                  </a:solidFill>
-                </a14:hiddenFill>
-              </a:ext>
-            </a:extLst>
-          </p:spPr>
-        </p:pic>
-      </p:grpSp>
-      <p:grpSp>
-        <p:nvGrpSpPr>
           <p:cNvPr id="27" name="Group 26">
             <a:extLst>
               <a:ext uri="{FF2B5EF4-FFF2-40B4-BE49-F238E27FC236}">
@@ -8304,7 +7260,7 @@
               </a:r>
               <a:r>
                 <a:rPr lang="es-ES" sz="1400" dirty="0">
-                  <a:hlinkClick r:id="rId17">
+                  <a:hlinkClick r:id="rId14">
                     <a:extLst>
                       <a:ext uri="{A12FA001-AC4F-418D-AE19-62706E023703}">
                         <ahyp:hlinkClr xmlns:ahyp="http://schemas.microsoft.com/office/drawing/2018/hyperlinkcolor" val="tx"/>
@@ -8596,7 +7552,7 @@
                 </a:r>
                 <a:r>
                   <a:rPr lang="es-ES" sz="1400" dirty="0">
-                    <a:hlinkClick r:id="rId18">
+                    <a:hlinkClick r:id="rId15">
                       <a:extLst>
                         <a:ext uri="{A12FA001-AC4F-418D-AE19-62706E023703}">
                           <ahyp:hlinkClr xmlns:ahyp="http://schemas.microsoft.com/office/drawing/2018/hyperlinkcolor" val="tx"/>
@@ -8629,7 +7585,7 @@
             <p:nvPr/>
           </p:nvPicPr>
           <p:blipFill>
-            <a:blip r:embed="rId19">
+            <a:blip r:embed="rId16">
               <a:extLst>
                 <a:ext uri="{28A0092B-C50C-407E-A947-70E740481C1C}">
                   <a14:useLocalDpi xmlns:a14="http://schemas.microsoft.com/office/drawing/2010/main" val="0"/>
@@ -8651,255 +7607,1304 @@
           </p:spPr>
         </p:pic>
       </p:grpSp>
-      <p:sp>
-        <p:nvSpPr>
-          <p:cNvPr id="2" name="Content Placeholder 2">
+      <p:grpSp>
+        <p:nvGrpSpPr>
+          <p:cNvPr id="4" name="Group 3">
             <a:extLst>
               <a:ext uri="{FF2B5EF4-FFF2-40B4-BE49-F238E27FC236}">
-                <a16:creationId xmlns:a16="http://schemas.microsoft.com/office/drawing/2014/main" id="{6A7B7D32-9656-B93B-9D9F-EA83F43037FD}"/>
+                <a16:creationId xmlns:a16="http://schemas.microsoft.com/office/drawing/2014/main" id="{793F3933-E9CE-CCA7-2D60-C05C59C9C9CA}"/>
               </a:ext>
             </a:extLst>
           </p:cNvPr>
-          <p:cNvSpPr txBox="1">
-            <a:spLocks/>
-          </p:cNvSpPr>
+          <p:cNvGrpSpPr/>
           <p:nvPr/>
-        </p:nvSpPr>
-        <p:spPr>
+        </p:nvGrpSpPr>
+        <p:grpSpPr>
           <a:xfrm>
-            <a:off x="909960" y="4946650"/>
-            <a:ext cx="1851304" cy="297180"/>
+            <a:off x="404329" y="2925218"/>
+            <a:ext cx="2200050" cy="2331021"/>
+            <a:chOff x="566283" y="2939334"/>
+            <a:chExt cx="2200050" cy="2331021"/>
           </a:xfrm>
-          <a:prstGeom prst="rect">
-            <a:avLst/>
-          </a:prstGeom>
-        </p:spPr>
-        <p:txBody>
-          <a:bodyPr vert="horz" lIns="91440" tIns="45720" rIns="91440" bIns="45720" rtlCol="0">
-            <a:noAutofit/>
-          </a:bodyPr>
-          <a:lstStyle>
-            <a:lvl1pPr marL="228600" indent="-228600" algn="l" defTabSz="914400" rtl="0" eaLnBrk="1" latinLnBrk="0" hangingPunct="1">
-              <a:lnSpc>
-                <a:spcPct val="110000"/>
-              </a:lnSpc>
-              <a:spcBef>
-                <a:spcPts val="1000"/>
-              </a:spcBef>
-              <a:buFont typeface="Arial" panose="020B0604020202020204" pitchFamily="34" charset="0"/>
-              <a:buChar char="•"/>
-              <a:defRPr sz="1800" kern="1200">
-                <a:solidFill>
-                  <a:schemeClr val="tx1"/>
-                </a:solidFill>
-                <a:latin typeface="+mn-lt"/>
-                <a:ea typeface="+mn-ea"/>
-                <a:cs typeface="+mn-cs"/>
-              </a:defRPr>
-            </a:lvl1pPr>
-            <a:lvl2pPr marL="685800" indent="-228600" algn="l" defTabSz="914400" rtl="0" eaLnBrk="1" latinLnBrk="0" hangingPunct="1">
-              <a:lnSpc>
-                <a:spcPct val="110000"/>
-              </a:lnSpc>
-              <a:spcBef>
-                <a:spcPts val="500"/>
-              </a:spcBef>
-              <a:buFont typeface="Arial" panose="020B0604020202020204" pitchFamily="34" charset="0"/>
-              <a:buChar char="•"/>
-              <a:defRPr sz="1600" kern="1200">
-                <a:solidFill>
-                  <a:schemeClr val="tx1"/>
-                </a:solidFill>
-                <a:latin typeface="+mn-lt"/>
-                <a:ea typeface="+mn-ea"/>
-                <a:cs typeface="+mn-cs"/>
-              </a:defRPr>
-            </a:lvl2pPr>
-            <a:lvl3pPr marL="1143000" indent="-228600" algn="l" defTabSz="914400" rtl="0" eaLnBrk="1" latinLnBrk="0" hangingPunct="1">
-              <a:lnSpc>
-                <a:spcPct val="110000"/>
-              </a:lnSpc>
-              <a:spcBef>
-                <a:spcPts val="500"/>
-              </a:spcBef>
-              <a:buFont typeface="Arial" panose="020B0604020202020204" pitchFamily="34" charset="0"/>
-              <a:buChar char="•"/>
-              <a:defRPr sz="1400" kern="1200">
-                <a:solidFill>
-                  <a:schemeClr val="tx1"/>
-                </a:solidFill>
-                <a:latin typeface="+mn-lt"/>
-                <a:ea typeface="+mn-ea"/>
-                <a:cs typeface="+mn-cs"/>
-              </a:defRPr>
-            </a:lvl3pPr>
-            <a:lvl4pPr marL="1600200" indent="-228600" algn="l" defTabSz="914400" rtl="0" eaLnBrk="1" latinLnBrk="0" hangingPunct="1">
-              <a:lnSpc>
-                <a:spcPct val="110000"/>
-              </a:lnSpc>
-              <a:spcBef>
-                <a:spcPts val="500"/>
-              </a:spcBef>
-              <a:buFont typeface="Arial" panose="020B0604020202020204" pitchFamily="34" charset="0"/>
-              <a:buChar char="•"/>
-              <a:defRPr sz="1200" kern="1200">
-                <a:solidFill>
-                  <a:schemeClr val="tx1"/>
-                </a:solidFill>
-                <a:latin typeface="+mn-lt"/>
-                <a:ea typeface="+mn-ea"/>
-                <a:cs typeface="+mn-cs"/>
-              </a:defRPr>
-            </a:lvl4pPr>
-            <a:lvl5pPr marL="2057400" indent="-228600" algn="l" defTabSz="914400" rtl="0" eaLnBrk="1" latinLnBrk="0" hangingPunct="1">
-              <a:lnSpc>
-                <a:spcPct val="110000"/>
-              </a:lnSpc>
-              <a:spcBef>
-                <a:spcPts val="500"/>
-              </a:spcBef>
-              <a:buFont typeface="Arial" panose="020B0604020202020204" pitchFamily="34" charset="0"/>
-              <a:buChar char="•"/>
-              <a:defRPr sz="1200" kern="1200">
-                <a:solidFill>
-                  <a:schemeClr val="tx1"/>
-                </a:solidFill>
-                <a:latin typeface="+mn-lt"/>
-                <a:ea typeface="+mn-ea"/>
-                <a:cs typeface="+mn-cs"/>
-              </a:defRPr>
-            </a:lvl5pPr>
-            <a:lvl6pPr marL="2514600" indent="-228600" algn="l" defTabSz="914400" rtl="0" eaLnBrk="1" latinLnBrk="0" hangingPunct="1">
-              <a:lnSpc>
-                <a:spcPct val="90000"/>
-              </a:lnSpc>
-              <a:spcBef>
-                <a:spcPts val="500"/>
-              </a:spcBef>
-              <a:buFont typeface="Arial" panose="020B0604020202020204" pitchFamily="34" charset="0"/>
-              <a:buChar char="•"/>
-              <a:defRPr sz="1800" kern="1200">
-                <a:solidFill>
-                  <a:schemeClr val="tx1"/>
-                </a:solidFill>
-                <a:latin typeface="+mn-lt"/>
-                <a:ea typeface="+mn-ea"/>
-                <a:cs typeface="+mn-cs"/>
-              </a:defRPr>
-            </a:lvl6pPr>
-            <a:lvl7pPr marL="2971800" indent="-228600" algn="l" defTabSz="914400" rtl="0" eaLnBrk="1" latinLnBrk="0" hangingPunct="1">
-              <a:lnSpc>
-                <a:spcPct val="90000"/>
-              </a:lnSpc>
-              <a:spcBef>
-                <a:spcPts val="500"/>
-              </a:spcBef>
-              <a:buFont typeface="Arial" panose="020B0604020202020204" pitchFamily="34" charset="0"/>
-              <a:buChar char="•"/>
-              <a:defRPr sz="1800" kern="1200">
-                <a:solidFill>
-                  <a:schemeClr val="tx1"/>
-                </a:solidFill>
-                <a:latin typeface="+mn-lt"/>
-                <a:ea typeface="+mn-ea"/>
-                <a:cs typeface="+mn-cs"/>
-              </a:defRPr>
-            </a:lvl7pPr>
-            <a:lvl8pPr marL="3429000" indent="-228600" algn="l" defTabSz="914400" rtl="0" eaLnBrk="1" latinLnBrk="0" hangingPunct="1">
-              <a:lnSpc>
-                <a:spcPct val="90000"/>
-              </a:lnSpc>
-              <a:spcBef>
-                <a:spcPts val="500"/>
-              </a:spcBef>
-              <a:buFont typeface="Arial" panose="020B0604020202020204" pitchFamily="34" charset="0"/>
-              <a:buChar char="•"/>
-              <a:defRPr sz="1800" kern="1200">
-                <a:solidFill>
-                  <a:schemeClr val="tx1"/>
-                </a:solidFill>
-                <a:latin typeface="+mn-lt"/>
-                <a:ea typeface="+mn-ea"/>
-                <a:cs typeface="+mn-cs"/>
-              </a:defRPr>
-            </a:lvl8pPr>
-            <a:lvl9pPr marL="3886200" indent="-228600" algn="l" defTabSz="914400" rtl="0" eaLnBrk="1" latinLnBrk="0" hangingPunct="1">
-              <a:lnSpc>
-                <a:spcPct val="90000"/>
-              </a:lnSpc>
-              <a:spcBef>
-                <a:spcPts val="500"/>
-              </a:spcBef>
-              <a:buFont typeface="Arial" panose="020B0604020202020204" pitchFamily="34" charset="0"/>
-              <a:buChar char="•"/>
-              <a:defRPr sz="1800" kern="1200">
-                <a:solidFill>
-                  <a:schemeClr val="tx1"/>
-                </a:solidFill>
-                <a:latin typeface="+mn-lt"/>
-                <a:ea typeface="+mn-ea"/>
-                <a:cs typeface="+mn-cs"/>
-              </a:defRPr>
-            </a:lvl9pPr>
-          </a:lstStyle>
-          <a:p>
-            <a:pPr marL="0" indent="0">
-              <a:buNone/>
-            </a:pPr>
-            <a:r>
-              <a:rPr lang="es-ES" sz="1300" dirty="0"/>
-              <a:t>0000-0002-7497-8795</a:t>
-            </a:r>
-          </a:p>
-        </p:txBody>
-      </p:sp>
-      <p:pic>
-        <p:nvPicPr>
-          <p:cNvPr id="1041" name="Picture 17">
+        </p:grpSpPr>
+        <p:grpSp>
+          <p:nvGrpSpPr>
+            <p:cNvPr id="48" name="Group 47">
+              <a:extLst>
+                <a:ext uri="{FF2B5EF4-FFF2-40B4-BE49-F238E27FC236}">
+                  <a16:creationId xmlns:a16="http://schemas.microsoft.com/office/drawing/2014/main" id="{D01BE9F1-B9A5-CB40-671E-337E0F319CEB}"/>
+                </a:ext>
+              </a:extLst>
+            </p:cNvPr>
+            <p:cNvGrpSpPr/>
+            <p:nvPr/>
+          </p:nvGrpSpPr>
+          <p:grpSpPr>
+            <a:xfrm>
+              <a:off x="566283" y="2939334"/>
+              <a:ext cx="2200050" cy="1873415"/>
+              <a:chOff x="334506" y="2530632"/>
+              <a:chExt cx="2200050" cy="1873415"/>
+            </a:xfrm>
+          </p:grpSpPr>
+          <p:pic>
+            <p:nvPicPr>
+              <p:cNvPr id="40" name="Picture 4" descr="GitHub Logomark">
+                <a:extLst>
+                  <a:ext uri="{FF2B5EF4-FFF2-40B4-BE49-F238E27FC236}">
+                    <a16:creationId xmlns:a16="http://schemas.microsoft.com/office/drawing/2014/main" id="{96A59221-217E-B2B8-CB7A-4D96FDAAD6D5}"/>
+                  </a:ext>
+                </a:extLst>
+              </p:cNvPr>
+              <p:cNvPicPr>
+                <a:picLocks noChangeAspect="1" noChangeArrowheads="1"/>
+              </p:cNvPicPr>
+              <p:nvPr/>
+            </p:nvPicPr>
+            <p:blipFill>
+              <a:blip r:embed="rId4">
+                <a:clrChange>
+                  <a:clrFrom>
+                    <a:srgbClr val="FFFFFF"/>
+                  </a:clrFrom>
+                  <a:clrTo>
+                    <a:srgbClr val="FFFFFF">
+                      <a:alpha val="0"/>
+                    </a:srgbClr>
+                  </a:clrTo>
+                </a:clrChange>
+                <a:extLst>
+                  <a:ext uri="{28A0092B-C50C-407E-A947-70E740481C1C}">
+                    <a14:useLocalDpi xmlns:a14="http://schemas.microsoft.com/office/drawing/2010/main" val="0"/>
+                  </a:ext>
+                </a:extLst>
+              </a:blip>
+              <a:srcRect/>
+              <a:stretch>
+                <a:fillRect/>
+              </a:stretch>
+            </p:blipFill>
+            <p:spPr bwMode="auto">
+              <a:xfrm>
+                <a:off x="368299" y="2530632"/>
+                <a:ext cx="314953" cy="314953"/>
+              </a:xfrm>
+              <a:prstGeom prst="rect">
+                <a:avLst/>
+              </a:prstGeom>
+              <a:noFill/>
+              <a:extLst>
+                <a:ext uri="{909E8E84-426E-40DD-AFC4-6F175D3DCCD1}">
+                  <a14:hiddenFill xmlns:a14="http://schemas.microsoft.com/office/drawing/2010/main">
+                    <a:solidFill>
+                      <a:srgbClr val="FFFFFF"/>
+                    </a:solidFill>
+                  </a14:hiddenFill>
+                </a:ext>
+              </a:extLst>
+            </p:spPr>
+          </p:pic>
+          <p:sp>
+            <p:nvSpPr>
+              <p:cNvPr id="41" name="Content Placeholder 2">
+                <a:extLst>
+                  <a:ext uri="{FF2B5EF4-FFF2-40B4-BE49-F238E27FC236}">
+                    <a16:creationId xmlns:a16="http://schemas.microsoft.com/office/drawing/2014/main" id="{C3F2A1BD-B9F7-7C4D-0973-37A062AD3375}"/>
+                  </a:ext>
+                </a:extLst>
+              </p:cNvPr>
+              <p:cNvSpPr txBox="1">
+                <a:spLocks/>
+              </p:cNvSpPr>
+              <p:nvPr/>
+            </p:nvSpPr>
+            <p:spPr>
+              <a:xfrm>
+                <a:off x="683252" y="2548405"/>
+                <a:ext cx="1851304" cy="297180"/>
+              </a:xfrm>
+              <a:prstGeom prst="rect">
+                <a:avLst/>
+              </a:prstGeom>
+            </p:spPr>
+            <p:txBody>
+              <a:bodyPr vert="horz" lIns="91440" tIns="45720" rIns="91440" bIns="45720" rtlCol="0">
+                <a:normAutofit fontScale="85000" lnSpcReduction="20000"/>
+              </a:bodyPr>
+              <a:lstStyle>
+                <a:lvl1pPr marL="228600" indent="-228600" algn="l" defTabSz="914400" rtl="0" eaLnBrk="1" latinLnBrk="0" hangingPunct="1">
+                  <a:lnSpc>
+                    <a:spcPct val="110000"/>
+                  </a:lnSpc>
+                  <a:spcBef>
+                    <a:spcPts val="1000"/>
+                  </a:spcBef>
+                  <a:buFont typeface="Arial" panose="020B0604020202020204" pitchFamily="34" charset="0"/>
+                  <a:buChar char="•"/>
+                  <a:defRPr sz="1800" kern="1200">
+                    <a:solidFill>
+                      <a:schemeClr val="tx1"/>
+                    </a:solidFill>
+                    <a:latin typeface="+mn-lt"/>
+                    <a:ea typeface="+mn-ea"/>
+                    <a:cs typeface="+mn-cs"/>
+                  </a:defRPr>
+                </a:lvl1pPr>
+                <a:lvl2pPr marL="685800" indent="-228600" algn="l" defTabSz="914400" rtl="0" eaLnBrk="1" latinLnBrk="0" hangingPunct="1">
+                  <a:lnSpc>
+                    <a:spcPct val="110000"/>
+                  </a:lnSpc>
+                  <a:spcBef>
+                    <a:spcPts val="500"/>
+                  </a:spcBef>
+                  <a:buFont typeface="Arial" panose="020B0604020202020204" pitchFamily="34" charset="0"/>
+                  <a:buChar char="•"/>
+                  <a:defRPr sz="1600" kern="1200">
+                    <a:solidFill>
+                      <a:schemeClr val="tx1"/>
+                    </a:solidFill>
+                    <a:latin typeface="+mn-lt"/>
+                    <a:ea typeface="+mn-ea"/>
+                    <a:cs typeface="+mn-cs"/>
+                  </a:defRPr>
+                </a:lvl2pPr>
+                <a:lvl3pPr marL="1143000" indent="-228600" algn="l" defTabSz="914400" rtl="0" eaLnBrk="1" latinLnBrk="0" hangingPunct="1">
+                  <a:lnSpc>
+                    <a:spcPct val="110000"/>
+                  </a:lnSpc>
+                  <a:spcBef>
+                    <a:spcPts val="500"/>
+                  </a:spcBef>
+                  <a:buFont typeface="Arial" panose="020B0604020202020204" pitchFamily="34" charset="0"/>
+                  <a:buChar char="•"/>
+                  <a:defRPr sz="1400" kern="1200">
+                    <a:solidFill>
+                      <a:schemeClr val="tx1"/>
+                    </a:solidFill>
+                    <a:latin typeface="+mn-lt"/>
+                    <a:ea typeface="+mn-ea"/>
+                    <a:cs typeface="+mn-cs"/>
+                  </a:defRPr>
+                </a:lvl3pPr>
+                <a:lvl4pPr marL="1600200" indent="-228600" algn="l" defTabSz="914400" rtl="0" eaLnBrk="1" latinLnBrk="0" hangingPunct="1">
+                  <a:lnSpc>
+                    <a:spcPct val="110000"/>
+                  </a:lnSpc>
+                  <a:spcBef>
+                    <a:spcPts val="500"/>
+                  </a:spcBef>
+                  <a:buFont typeface="Arial" panose="020B0604020202020204" pitchFamily="34" charset="0"/>
+                  <a:buChar char="•"/>
+                  <a:defRPr sz="1200" kern="1200">
+                    <a:solidFill>
+                      <a:schemeClr val="tx1"/>
+                    </a:solidFill>
+                    <a:latin typeface="+mn-lt"/>
+                    <a:ea typeface="+mn-ea"/>
+                    <a:cs typeface="+mn-cs"/>
+                  </a:defRPr>
+                </a:lvl4pPr>
+                <a:lvl5pPr marL="2057400" indent="-228600" algn="l" defTabSz="914400" rtl="0" eaLnBrk="1" latinLnBrk="0" hangingPunct="1">
+                  <a:lnSpc>
+                    <a:spcPct val="110000"/>
+                  </a:lnSpc>
+                  <a:spcBef>
+                    <a:spcPts val="500"/>
+                  </a:spcBef>
+                  <a:buFont typeface="Arial" panose="020B0604020202020204" pitchFamily="34" charset="0"/>
+                  <a:buChar char="•"/>
+                  <a:defRPr sz="1200" kern="1200">
+                    <a:solidFill>
+                      <a:schemeClr val="tx1"/>
+                    </a:solidFill>
+                    <a:latin typeface="+mn-lt"/>
+                    <a:ea typeface="+mn-ea"/>
+                    <a:cs typeface="+mn-cs"/>
+                  </a:defRPr>
+                </a:lvl5pPr>
+                <a:lvl6pPr marL="2514600" indent="-228600" algn="l" defTabSz="914400" rtl="0" eaLnBrk="1" latinLnBrk="0" hangingPunct="1">
+                  <a:lnSpc>
+                    <a:spcPct val="90000"/>
+                  </a:lnSpc>
+                  <a:spcBef>
+                    <a:spcPts val="500"/>
+                  </a:spcBef>
+                  <a:buFont typeface="Arial" panose="020B0604020202020204" pitchFamily="34" charset="0"/>
+                  <a:buChar char="•"/>
+                  <a:defRPr sz="1800" kern="1200">
+                    <a:solidFill>
+                      <a:schemeClr val="tx1"/>
+                    </a:solidFill>
+                    <a:latin typeface="+mn-lt"/>
+                    <a:ea typeface="+mn-ea"/>
+                    <a:cs typeface="+mn-cs"/>
+                  </a:defRPr>
+                </a:lvl6pPr>
+                <a:lvl7pPr marL="2971800" indent="-228600" algn="l" defTabSz="914400" rtl="0" eaLnBrk="1" latinLnBrk="0" hangingPunct="1">
+                  <a:lnSpc>
+                    <a:spcPct val="90000"/>
+                  </a:lnSpc>
+                  <a:spcBef>
+                    <a:spcPts val="500"/>
+                  </a:spcBef>
+                  <a:buFont typeface="Arial" panose="020B0604020202020204" pitchFamily="34" charset="0"/>
+                  <a:buChar char="•"/>
+                  <a:defRPr sz="1800" kern="1200">
+                    <a:solidFill>
+                      <a:schemeClr val="tx1"/>
+                    </a:solidFill>
+                    <a:latin typeface="+mn-lt"/>
+                    <a:ea typeface="+mn-ea"/>
+                    <a:cs typeface="+mn-cs"/>
+                  </a:defRPr>
+                </a:lvl7pPr>
+                <a:lvl8pPr marL="3429000" indent="-228600" algn="l" defTabSz="914400" rtl="0" eaLnBrk="1" latinLnBrk="0" hangingPunct="1">
+                  <a:lnSpc>
+                    <a:spcPct val="90000"/>
+                  </a:lnSpc>
+                  <a:spcBef>
+                    <a:spcPts val="500"/>
+                  </a:spcBef>
+                  <a:buFont typeface="Arial" panose="020B0604020202020204" pitchFamily="34" charset="0"/>
+                  <a:buChar char="•"/>
+                  <a:defRPr sz="1800" kern="1200">
+                    <a:solidFill>
+                      <a:schemeClr val="tx1"/>
+                    </a:solidFill>
+                    <a:latin typeface="+mn-lt"/>
+                    <a:ea typeface="+mn-ea"/>
+                    <a:cs typeface="+mn-cs"/>
+                  </a:defRPr>
+                </a:lvl8pPr>
+                <a:lvl9pPr marL="3886200" indent="-228600" algn="l" defTabSz="914400" rtl="0" eaLnBrk="1" latinLnBrk="0" hangingPunct="1">
+                  <a:lnSpc>
+                    <a:spcPct val="90000"/>
+                  </a:lnSpc>
+                  <a:spcBef>
+                    <a:spcPts val="500"/>
+                  </a:spcBef>
+                  <a:buFont typeface="Arial" panose="020B0604020202020204" pitchFamily="34" charset="0"/>
+                  <a:buChar char="•"/>
+                  <a:defRPr sz="1800" kern="1200">
+                    <a:solidFill>
+                      <a:schemeClr val="tx1"/>
+                    </a:solidFill>
+                    <a:latin typeface="+mn-lt"/>
+                    <a:ea typeface="+mn-ea"/>
+                    <a:cs typeface="+mn-cs"/>
+                  </a:defRPr>
+                </a:lvl9pPr>
+              </a:lstStyle>
+              <a:p>
+                <a:pPr marL="0" indent="0">
+                  <a:buNone/>
+                </a:pPr>
+                <a:r>
+                  <a:rPr lang="es-ES" dirty="0" err="1"/>
+                  <a:t>misantamaria</a:t>
+                </a:r>
+                <a:endParaRPr lang="es-ES" sz="1400" dirty="0"/>
+              </a:p>
+            </p:txBody>
+          </p:sp>
+          <p:sp>
+            <p:nvSpPr>
+              <p:cNvPr id="42" name="Content Placeholder 2">
+                <a:extLst>
+                  <a:ext uri="{FF2B5EF4-FFF2-40B4-BE49-F238E27FC236}">
+                    <a16:creationId xmlns:a16="http://schemas.microsoft.com/office/drawing/2014/main" id="{14BBAA76-FBBD-AECC-082B-0DF8F9FE194B}"/>
+                  </a:ext>
+                </a:extLst>
+              </p:cNvPr>
+              <p:cNvSpPr txBox="1">
+                <a:spLocks/>
+              </p:cNvSpPr>
+              <p:nvPr/>
+            </p:nvSpPr>
+            <p:spPr>
+              <a:xfrm>
+                <a:off x="683252" y="2915051"/>
+                <a:ext cx="1851304" cy="297180"/>
+              </a:xfrm>
+              <a:prstGeom prst="rect">
+                <a:avLst/>
+              </a:prstGeom>
+            </p:spPr>
+            <p:txBody>
+              <a:bodyPr vert="horz" lIns="91440" tIns="45720" rIns="91440" bIns="45720" rtlCol="0">
+                <a:normAutofit fontScale="85000" lnSpcReduction="20000"/>
+              </a:bodyPr>
+              <a:lstStyle>
+                <a:lvl1pPr marL="228600" indent="-228600" algn="l" defTabSz="914400" rtl="0" eaLnBrk="1" latinLnBrk="0" hangingPunct="1">
+                  <a:lnSpc>
+                    <a:spcPct val="110000"/>
+                  </a:lnSpc>
+                  <a:spcBef>
+                    <a:spcPts val="1000"/>
+                  </a:spcBef>
+                  <a:buFont typeface="Arial" panose="020B0604020202020204" pitchFamily="34" charset="0"/>
+                  <a:buChar char="•"/>
+                  <a:defRPr sz="1800" kern="1200">
+                    <a:solidFill>
+                      <a:schemeClr val="tx1"/>
+                    </a:solidFill>
+                    <a:latin typeface="+mn-lt"/>
+                    <a:ea typeface="+mn-ea"/>
+                    <a:cs typeface="+mn-cs"/>
+                  </a:defRPr>
+                </a:lvl1pPr>
+                <a:lvl2pPr marL="685800" indent="-228600" algn="l" defTabSz="914400" rtl="0" eaLnBrk="1" latinLnBrk="0" hangingPunct="1">
+                  <a:lnSpc>
+                    <a:spcPct val="110000"/>
+                  </a:lnSpc>
+                  <a:spcBef>
+                    <a:spcPts val="500"/>
+                  </a:spcBef>
+                  <a:buFont typeface="Arial" panose="020B0604020202020204" pitchFamily="34" charset="0"/>
+                  <a:buChar char="•"/>
+                  <a:defRPr sz="1600" kern="1200">
+                    <a:solidFill>
+                      <a:schemeClr val="tx1"/>
+                    </a:solidFill>
+                    <a:latin typeface="+mn-lt"/>
+                    <a:ea typeface="+mn-ea"/>
+                    <a:cs typeface="+mn-cs"/>
+                  </a:defRPr>
+                </a:lvl2pPr>
+                <a:lvl3pPr marL="1143000" indent="-228600" algn="l" defTabSz="914400" rtl="0" eaLnBrk="1" latinLnBrk="0" hangingPunct="1">
+                  <a:lnSpc>
+                    <a:spcPct val="110000"/>
+                  </a:lnSpc>
+                  <a:spcBef>
+                    <a:spcPts val="500"/>
+                  </a:spcBef>
+                  <a:buFont typeface="Arial" panose="020B0604020202020204" pitchFamily="34" charset="0"/>
+                  <a:buChar char="•"/>
+                  <a:defRPr sz="1400" kern="1200">
+                    <a:solidFill>
+                      <a:schemeClr val="tx1"/>
+                    </a:solidFill>
+                    <a:latin typeface="+mn-lt"/>
+                    <a:ea typeface="+mn-ea"/>
+                    <a:cs typeface="+mn-cs"/>
+                  </a:defRPr>
+                </a:lvl3pPr>
+                <a:lvl4pPr marL="1600200" indent="-228600" algn="l" defTabSz="914400" rtl="0" eaLnBrk="1" latinLnBrk="0" hangingPunct="1">
+                  <a:lnSpc>
+                    <a:spcPct val="110000"/>
+                  </a:lnSpc>
+                  <a:spcBef>
+                    <a:spcPts val="500"/>
+                  </a:spcBef>
+                  <a:buFont typeface="Arial" panose="020B0604020202020204" pitchFamily="34" charset="0"/>
+                  <a:buChar char="•"/>
+                  <a:defRPr sz="1200" kern="1200">
+                    <a:solidFill>
+                      <a:schemeClr val="tx1"/>
+                    </a:solidFill>
+                    <a:latin typeface="+mn-lt"/>
+                    <a:ea typeface="+mn-ea"/>
+                    <a:cs typeface="+mn-cs"/>
+                  </a:defRPr>
+                </a:lvl4pPr>
+                <a:lvl5pPr marL="2057400" indent="-228600" algn="l" defTabSz="914400" rtl="0" eaLnBrk="1" latinLnBrk="0" hangingPunct="1">
+                  <a:lnSpc>
+                    <a:spcPct val="110000"/>
+                  </a:lnSpc>
+                  <a:spcBef>
+                    <a:spcPts val="500"/>
+                  </a:spcBef>
+                  <a:buFont typeface="Arial" panose="020B0604020202020204" pitchFamily="34" charset="0"/>
+                  <a:buChar char="•"/>
+                  <a:defRPr sz="1200" kern="1200">
+                    <a:solidFill>
+                      <a:schemeClr val="tx1"/>
+                    </a:solidFill>
+                    <a:latin typeface="+mn-lt"/>
+                    <a:ea typeface="+mn-ea"/>
+                    <a:cs typeface="+mn-cs"/>
+                  </a:defRPr>
+                </a:lvl5pPr>
+                <a:lvl6pPr marL="2514600" indent="-228600" algn="l" defTabSz="914400" rtl="0" eaLnBrk="1" latinLnBrk="0" hangingPunct="1">
+                  <a:lnSpc>
+                    <a:spcPct val="90000"/>
+                  </a:lnSpc>
+                  <a:spcBef>
+                    <a:spcPts val="500"/>
+                  </a:spcBef>
+                  <a:buFont typeface="Arial" panose="020B0604020202020204" pitchFamily="34" charset="0"/>
+                  <a:buChar char="•"/>
+                  <a:defRPr sz="1800" kern="1200">
+                    <a:solidFill>
+                      <a:schemeClr val="tx1"/>
+                    </a:solidFill>
+                    <a:latin typeface="+mn-lt"/>
+                    <a:ea typeface="+mn-ea"/>
+                    <a:cs typeface="+mn-cs"/>
+                  </a:defRPr>
+                </a:lvl6pPr>
+                <a:lvl7pPr marL="2971800" indent="-228600" algn="l" defTabSz="914400" rtl="0" eaLnBrk="1" latinLnBrk="0" hangingPunct="1">
+                  <a:lnSpc>
+                    <a:spcPct val="90000"/>
+                  </a:lnSpc>
+                  <a:spcBef>
+                    <a:spcPts val="500"/>
+                  </a:spcBef>
+                  <a:buFont typeface="Arial" panose="020B0604020202020204" pitchFamily="34" charset="0"/>
+                  <a:buChar char="•"/>
+                  <a:defRPr sz="1800" kern="1200">
+                    <a:solidFill>
+                      <a:schemeClr val="tx1"/>
+                    </a:solidFill>
+                    <a:latin typeface="+mn-lt"/>
+                    <a:ea typeface="+mn-ea"/>
+                    <a:cs typeface="+mn-cs"/>
+                  </a:defRPr>
+                </a:lvl7pPr>
+                <a:lvl8pPr marL="3429000" indent="-228600" algn="l" defTabSz="914400" rtl="0" eaLnBrk="1" latinLnBrk="0" hangingPunct="1">
+                  <a:lnSpc>
+                    <a:spcPct val="90000"/>
+                  </a:lnSpc>
+                  <a:spcBef>
+                    <a:spcPts val="500"/>
+                  </a:spcBef>
+                  <a:buFont typeface="Arial" panose="020B0604020202020204" pitchFamily="34" charset="0"/>
+                  <a:buChar char="•"/>
+                  <a:defRPr sz="1800" kern="1200">
+                    <a:solidFill>
+                      <a:schemeClr val="tx1"/>
+                    </a:solidFill>
+                    <a:latin typeface="+mn-lt"/>
+                    <a:ea typeface="+mn-ea"/>
+                    <a:cs typeface="+mn-cs"/>
+                  </a:defRPr>
+                </a:lvl8pPr>
+                <a:lvl9pPr marL="3886200" indent="-228600" algn="l" defTabSz="914400" rtl="0" eaLnBrk="1" latinLnBrk="0" hangingPunct="1">
+                  <a:lnSpc>
+                    <a:spcPct val="90000"/>
+                  </a:lnSpc>
+                  <a:spcBef>
+                    <a:spcPts val="500"/>
+                  </a:spcBef>
+                  <a:buFont typeface="Arial" panose="020B0604020202020204" pitchFamily="34" charset="0"/>
+                  <a:buChar char="•"/>
+                  <a:defRPr sz="1800" kern="1200">
+                    <a:solidFill>
+                      <a:schemeClr val="tx1"/>
+                    </a:solidFill>
+                    <a:latin typeface="+mn-lt"/>
+                    <a:ea typeface="+mn-ea"/>
+                    <a:cs typeface="+mn-cs"/>
+                  </a:defRPr>
+                </a:lvl9pPr>
+              </a:lstStyle>
+              <a:p>
+                <a:pPr marL="0" indent="0">
+                  <a:buNone/>
+                </a:pPr>
+                <a:r>
+                  <a:rPr lang="es-ES" dirty="0" err="1"/>
+                  <a:t>misantamaria</a:t>
+                </a:r>
+                <a:endParaRPr lang="es-ES" sz="1400" dirty="0"/>
+              </a:p>
+            </p:txBody>
+          </p:sp>
+          <p:pic>
+            <p:nvPicPr>
+              <p:cNvPr id="43" name="Picture 6" descr="Brand assets - Hugging Face">
+                <a:extLst>
+                  <a:ext uri="{FF2B5EF4-FFF2-40B4-BE49-F238E27FC236}">
+                    <a16:creationId xmlns:a16="http://schemas.microsoft.com/office/drawing/2014/main" id="{88846DED-E219-DFBA-0AD2-9983B24CE0C4}"/>
+                  </a:ext>
+                </a:extLst>
+              </p:cNvPr>
+              <p:cNvPicPr>
+                <a:picLocks noChangeAspect="1" noChangeArrowheads="1"/>
+              </p:cNvPicPr>
+              <p:nvPr/>
+            </p:nvPicPr>
+            <p:blipFill>
+              <a:blip r:embed="rId7">
+                <a:clrChange>
+                  <a:clrFrom>
+                    <a:srgbClr val="FFFFFF"/>
+                  </a:clrFrom>
+                  <a:clrTo>
+                    <a:srgbClr val="FFFFFF">
+                      <a:alpha val="0"/>
+                    </a:srgbClr>
+                  </a:clrTo>
+                </a:clrChange>
+                <a:extLst>
+                  <a:ext uri="{28A0092B-C50C-407E-A947-70E740481C1C}">
+                    <a14:useLocalDpi xmlns:a14="http://schemas.microsoft.com/office/drawing/2010/main" val="0"/>
+                  </a:ext>
+                </a:extLst>
+              </a:blip>
+              <a:srcRect/>
+              <a:stretch>
+                <a:fillRect/>
+              </a:stretch>
+            </p:blipFill>
+            <p:spPr bwMode="auto">
+              <a:xfrm>
+                <a:off x="366605" y="2913869"/>
+                <a:ext cx="314953" cy="291646"/>
+              </a:xfrm>
+              <a:prstGeom prst="rect">
+                <a:avLst/>
+              </a:prstGeom>
+              <a:noFill/>
+              <a:extLst>
+                <a:ext uri="{909E8E84-426E-40DD-AFC4-6F175D3DCCD1}">
+                  <a14:hiddenFill xmlns:a14="http://schemas.microsoft.com/office/drawing/2010/main">
+                    <a:solidFill>
+                      <a:srgbClr val="FFFFFF"/>
+                    </a:solidFill>
+                  </a14:hiddenFill>
+                </a:ext>
+              </a:extLst>
+            </p:spPr>
+          </p:pic>
+          <p:pic>
+            <p:nvPicPr>
+              <p:cNvPr id="45" name="Graphic 44">
+                <a:extLst>
+                  <a:ext uri="{FF2B5EF4-FFF2-40B4-BE49-F238E27FC236}">
+                    <a16:creationId xmlns:a16="http://schemas.microsoft.com/office/drawing/2014/main" id="{98CA59E0-6EEF-78A6-912D-E694914CCE08}"/>
+                  </a:ext>
+                </a:extLst>
+              </p:cNvPr>
+              <p:cNvPicPr>
+                <a:picLocks noChangeAspect="1"/>
+              </p:cNvPicPr>
+              <p:nvPr/>
+            </p:nvPicPr>
+            <p:blipFill>
+              <a:blip r:embed="rId17">
+                <a:extLst>
+                  <a:ext uri="{96DAC541-7B7A-43D3-8B79-37D633B846F1}">
+                    <asvg:svgBlip xmlns:asvg="http://schemas.microsoft.com/office/drawing/2016/SVG/main" r:embed="rId18"/>
+                  </a:ext>
+                </a:extLst>
+              </a:blip>
+              <a:stretch>
+                <a:fillRect/>
+              </a:stretch>
+            </p:blipFill>
+            <p:spPr>
+              <a:xfrm>
+                <a:off x="334506" y="3399462"/>
+                <a:ext cx="379150" cy="379150"/>
+              </a:xfrm>
+              <a:prstGeom prst="rect">
+                <a:avLst/>
+              </a:prstGeom>
+            </p:spPr>
+          </p:pic>
+          <p:sp>
+            <p:nvSpPr>
+              <p:cNvPr id="46" name="Content Placeholder 2">
+                <a:extLst>
+                  <a:ext uri="{FF2B5EF4-FFF2-40B4-BE49-F238E27FC236}">
+                    <a16:creationId xmlns:a16="http://schemas.microsoft.com/office/drawing/2014/main" id="{288ED14F-2A8C-AA9A-46A9-B1FA39D7B373}"/>
+                  </a:ext>
+                </a:extLst>
+              </p:cNvPr>
+              <p:cNvSpPr txBox="1">
+                <a:spLocks/>
+              </p:cNvSpPr>
+              <p:nvPr/>
+            </p:nvSpPr>
+            <p:spPr>
+              <a:xfrm>
+                <a:off x="683252" y="3314321"/>
+                <a:ext cx="1851304" cy="297180"/>
+              </a:xfrm>
+              <a:prstGeom prst="rect">
+                <a:avLst/>
+              </a:prstGeom>
+            </p:spPr>
+            <p:txBody>
+              <a:bodyPr vert="horz" lIns="91440" tIns="45720" rIns="91440" bIns="45720" rtlCol="0">
+                <a:noAutofit/>
+              </a:bodyPr>
+              <a:lstStyle>
+                <a:lvl1pPr marL="228600" indent="-228600" algn="l" defTabSz="914400" rtl="0" eaLnBrk="1" latinLnBrk="0" hangingPunct="1">
+                  <a:lnSpc>
+                    <a:spcPct val="110000"/>
+                  </a:lnSpc>
+                  <a:spcBef>
+                    <a:spcPts val="1000"/>
+                  </a:spcBef>
+                  <a:buFont typeface="Arial" panose="020B0604020202020204" pitchFamily="34" charset="0"/>
+                  <a:buChar char="•"/>
+                  <a:defRPr sz="1800" kern="1200">
+                    <a:solidFill>
+                      <a:schemeClr val="tx1"/>
+                    </a:solidFill>
+                    <a:latin typeface="+mn-lt"/>
+                    <a:ea typeface="+mn-ea"/>
+                    <a:cs typeface="+mn-cs"/>
+                  </a:defRPr>
+                </a:lvl1pPr>
+                <a:lvl2pPr marL="685800" indent="-228600" algn="l" defTabSz="914400" rtl="0" eaLnBrk="1" latinLnBrk="0" hangingPunct="1">
+                  <a:lnSpc>
+                    <a:spcPct val="110000"/>
+                  </a:lnSpc>
+                  <a:spcBef>
+                    <a:spcPts val="500"/>
+                  </a:spcBef>
+                  <a:buFont typeface="Arial" panose="020B0604020202020204" pitchFamily="34" charset="0"/>
+                  <a:buChar char="•"/>
+                  <a:defRPr sz="1600" kern="1200">
+                    <a:solidFill>
+                      <a:schemeClr val="tx1"/>
+                    </a:solidFill>
+                    <a:latin typeface="+mn-lt"/>
+                    <a:ea typeface="+mn-ea"/>
+                    <a:cs typeface="+mn-cs"/>
+                  </a:defRPr>
+                </a:lvl2pPr>
+                <a:lvl3pPr marL="1143000" indent="-228600" algn="l" defTabSz="914400" rtl="0" eaLnBrk="1" latinLnBrk="0" hangingPunct="1">
+                  <a:lnSpc>
+                    <a:spcPct val="110000"/>
+                  </a:lnSpc>
+                  <a:spcBef>
+                    <a:spcPts val="500"/>
+                  </a:spcBef>
+                  <a:buFont typeface="Arial" panose="020B0604020202020204" pitchFamily="34" charset="0"/>
+                  <a:buChar char="•"/>
+                  <a:defRPr sz="1400" kern="1200">
+                    <a:solidFill>
+                      <a:schemeClr val="tx1"/>
+                    </a:solidFill>
+                    <a:latin typeface="+mn-lt"/>
+                    <a:ea typeface="+mn-ea"/>
+                    <a:cs typeface="+mn-cs"/>
+                  </a:defRPr>
+                </a:lvl3pPr>
+                <a:lvl4pPr marL="1600200" indent="-228600" algn="l" defTabSz="914400" rtl="0" eaLnBrk="1" latinLnBrk="0" hangingPunct="1">
+                  <a:lnSpc>
+                    <a:spcPct val="110000"/>
+                  </a:lnSpc>
+                  <a:spcBef>
+                    <a:spcPts val="500"/>
+                  </a:spcBef>
+                  <a:buFont typeface="Arial" panose="020B0604020202020204" pitchFamily="34" charset="0"/>
+                  <a:buChar char="•"/>
+                  <a:defRPr sz="1200" kern="1200">
+                    <a:solidFill>
+                      <a:schemeClr val="tx1"/>
+                    </a:solidFill>
+                    <a:latin typeface="+mn-lt"/>
+                    <a:ea typeface="+mn-ea"/>
+                    <a:cs typeface="+mn-cs"/>
+                  </a:defRPr>
+                </a:lvl4pPr>
+                <a:lvl5pPr marL="2057400" indent="-228600" algn="l" defTabSz="914400" rtl="0" eaLnBrk="1" latinLnBrk="0" hangingPunct="1">
+                  <a:lnSpc>
+                    <a:spcPct val="110000"/>
+                  </a:lnSpc>
+                  <a:spcBef>
+                    <a:spcPts val="500"/>
+                  </a:spcBef>
+                  <a:buFont typeface="Arial" panose="020B0604020202020204" pitchFamily="34" charset="0"/>
+                  <a:buChar char="•"/>
+                  <a:defRPr sz="1200" kern="1200">
+                    <a:solidFill>
+                      <a:schemeClr val="tx1"/>
+                    </a:solidFill>
+                    <a:latin typeface="+mn-lt"/>
+                    <a:ea typeface="+mn-ea"/>
+                    <a:cs typeface="+mn-cs"/>
+                  </a:defRPr>
+                </a:lvl5pPr>
+                <a:lvl6pPr marL="2514600" indent="-228600" algn="l" defTabSz="914400" rtl="0" eaLnBrk="1" latinLnBrk="0" hangingPunct="1">
+                  <a:lnSpc>
+                    <a:spcPct val="90000"/>
+                  </a:lnSpc>
+                  <a:spcBef>
+                    <a:spcPts val="500"/>
+                  </a:spcBef>
+                  <a:buFont typeface="Arial" panose="020B0604020202020204" pitchFamily="34" charset="0"/>
+                  <a:buChar char="•"/>
+                  <a:defRPr sz="1800" kern="1200">
+                    <a:solidFill>
+                      <a:schemeClr val="tx1"/>
+                    </a:solidFill>
+                    <a:latin typeface="+mn-lt"/>
+                    <a:ea typeface="+mn-ea"/>
+                    <a:cs typeface="+mn-cs"/>
+                  </a:defRPr>
+                </a:lvl6pPr>
+                <a:lvl7pPr marL="2971800" indent="-228600" algn="l" defTabSz="914400" rtl="0" eaLnBrk="1" latinLnBrk="0" hangingPunct="1">
+                  <a:lnSpc>
+                    <a:spcPct val="90000"/>
+                  </a:lnSpc>
+                  <a:spcBef>
+                    <a:spcPts val="500"/>
+                  </a:spcBef>
+                  <a:buFont typeface="Arial" panose="020B0604020202020204" pitchFamily="34" charset="0"/>
+                  <a:buChar char="•"/>
+                  <a:defRPr sz="1800" kern="1200">
+                    <a:solidFill>
+                      <a:schemeClr val="tx1"/>
+                    </a:solidFill>
+                    <a:latin typeface="+mn-lt"/>
+                    <a:ea typeface="+mn-ea"/>
+                    <a:cs typeface="+mn-cs"/>
+                  </a:defRPr>
+                </a:lvl7pPr>
+                <a:lvl8pPr marL="3429000" indent="-228600" algn="l" defTabSz="914400" rtl="0" eaLnBrk="1" latinLnBrk="0" hangingPunct="1">
+                  <a:lnSpc>
+                    <a:spcPct val="90000"/>
+                  </a:lnSpc>
+                  <a:spcBef>
+                    <a:spcPts val="500"/>
+                  </a:spcBef>
+                  <a:buFont typeface="Arial" panose="020B0604020202020204" pitchFamily="34" charset="0"/>
+                  <a:buChar char="•"/>
+                  <a:defRPr sz="1800" kern="1200">
+                    <a:solidFill>
+                      <a:schemeClr val="tx1"/>
+                    </a:solidFill>
+                    <a:latin typeface="+mn-lt"/>
+                    <a:ea typeface="+mn-ea"/>
+                    <a:cs typeface="+mn-cs"/>
+                  </a:defRPr>
+                </a:lvl8pPr>
+                <a:lvl9pPr marL="3886200" indent="-228600" algn="l" defTabSz="914400" rtl="0" eaLnBrk="1" latinLnBrk="0" hangingPunct="1">
+                  <a:lnSpc>
+                    <a:spcPct val="90000"/>
+                  </a:lnSpc>
+                  <a:spcBef>
+                    <a:spcPts val="500"/>
+                  </a:spcBef>
+                  <a:buFont typeface="Arial" panose="020B0604020202020204" pitchFamily="34" charset="0"/>
+                  <a:buChar char="•"/>
+                  <a:defRPr sz="1800" kern="1200">
+                    <a:solidFill>
+                      <a:schemeClr val="tx1"/>
+                    </a:solidFill>
+                    <a:latin typeface="+mn-lt"/>
+                    <a:ea typeface="+mn-ea"/>
+                    <a:cs typeface="+mn-cs"/>
+                  </a:defRPr>
+                </a:lvl9pPr>
+              </a:lstStyle>
+              <a:p>
+                <a:pPr marL="0" indent="0">
+                  <a:buNone/>
+                </a:pPr>
+                <a:r>
+                  <a:rPr lang="es-ES" sz="1300" dirty="0"/>
+                  <a:t>Inmaculada Santamaria-Valenzuela</a:t>
+                </a:r>
+              </a:p>
+            </p:txBody>
+          </p:sp>
+          <p:sp>
+            <p:nvSpPr>
+              <p:cNvPr id="47" name="Content Placeholder 2">
+                <a:extLst>
+                  <a:ext uri="{FF2B5EF4-FFF2-40B4-BE49-F238E27FC236}">
+                    <a16:creationId xmlns:a16="http://schemas.microsoft.com/office/drawing/2014/main" id="{3C0BFD95-5159-B91D-274E-57776F54F496}"/>
+                  </a:ext>
+                </a:extLst>
+              </p:cNvPr>
+              <p:cNvSpPr txBox="1">
+                <a:spLocks/>
+              </p:cNvSpPr>
+              <p:nvPr/>
+            </p:nvSpPr>
+            <p:spPr>
+              <a:xfrm>
+                <a:off x="678183" y="3937863"/>
+                <a:ext cx="1851304" cy="297180"/>
+              </a:xfrm>
+              <a:prstGeom prst="rect">
+                <a:avLst/>
+              </a:prstGeom>
+            </p:spPr>
+            <p:txBody>
+              <a:bodyPr vert="horz" lIns="91440" tIns="45720" rIns="91440" bIns="45720" rtlCol="0">
+                <a:noAutofit/>
+              </a:bodyPr>
+              <a:lstStyle>
+                <a:lvl1pPr marL="228600" indent="-228600" algn="l" defTabSz="914400" rtl="0" eaLnBrk="1" latinLnBrk="0" hangingPunct="1">
+                  <a:lnSpc>
+                    <a:spcPct val="110000"/>
+                  </a:lnSpc>
+                  <a:spcBef>
+                    <a:spcPts val="1000"/>
+                  </a:spcBef>
+                  <a:buFont typeface="Arial" panose="020B0604020202020204" pitchFamily="34" charset="0"/>
+                  <a:buChar char="•"/>
+                  <a:defRPr sz="1800" kern="1200">
+                    <a:solidFill>
+                      <a:schemeClr val="tx1"/>
+                    </a:solidFill>
+                    <a:latin typeface="+mn-lt"/>
+                    <a:ea typeface="+mn-ea"/>
+                    <a:cs typeface="+mn-cs"/>
+                  </a:defRPr>
+                </a:lvl1pPr>
+                <a:lvl2pPr marL="685800" indent="-228600" algn="l" defTabSz="914400" rtl="0" eaLnBrk="1" latinLnBrk="0" hangingPunct="1">
+                  <a:lnSpc>
+                    <a:spcPct val="110000"/>
+                  </a:lnSpc>
+                  <a:spcBef>
+                    <a:spcPts val="500"/>
+                  </a:spcBef>
+                  <a:buFont typeface="Arial" panose="020B0604020202020204" pitchFamily="34" charset="0"/>
+                  <a:buChar char="•"/>
+                  <a:defRPr sz="1600" kern="1200">
+                    <a:solidFill>
+                      <a:schemeClr val="tx1"/>
+                    </a:solidFill>
+                    <a:latin typeface="+mn-lt"/>
+                    <a:ea typeface="+mn-ea"/>
+                    <a:cs typeface="+mn-cs"/>
+                  </a:defRPr>
+                </a:lvl2pPr>
+                <a:lvl3pPr marL="1143000" indent="-228600" algn="l" defTabSz="914400" rtl="0" eaLnBrk="1" latinLnBrk="0" hangingPunct="1">
+                  <a:lnSpc>
+                    <a:spcPct val="110000"/>
+                  </a:lnSpc>
+                  <a:spcBef>
+                    <a:spcPts val="500"/>
+                  </a:spcBef>
+                  <a:buFont typeface="Arial" panose="020B0604020202020204" pitchFamily="34" charset="0"/>
+                  <a:buChar char="•"/>
+                  <a:defRPr sz="1400" kern="1200">
+                    <a:solidFill>
+                      <a:schemeClr val="tx1"/>
+                    </a:solidFill>
+                    <a:latin typeface="+mn-lt"/>
+                    <a:ea typeface="+mn-ea"/>
+                    <a:cs typeface="+mn-cs"/>
+                  </a:defRPr>
+                </a:lvl3pPr>
+                <a:lvl4pPr marL="1600200" indent="-228600" algn="l" defTabSz="914400" rtl="0" eaLnBrk="1" latinLnBrk="0" hangingPunct="1">
+                  <a:lnSpc>
+                    <a:spcPct val="110000"/>
+                  </a:lnSpc>
+                  <a:spcBef>
+                    <a:spcPts val="500"/>
+                  </a:spcBef>
+                  <a:buFont typeface="Arial" panose="020B0604020202020204" pitchFamily="34" charset="0"/>
+                  <a:buChar char="•"/>
+                  <a:defRPr sz="1200" kern="1200">
+                    <a:solidFill>
+                      <a:schemeClr val="tx1"/>
+                    </a:solidFill>
+                    <a:latin typeface="+mn-lt"/>
+                    <a:ea typeface="+mn-ea"/>
+                    <a:cs typeface="+mn-cs"/>
+                  </a:defRPr>
+                </a:lvl4pPr>
+                <a:lvl5pPr marL="2057400" indent="-228600" algn="l" defTabSz="914400" rtl="0" eaLnBrk="1" latinLnBrk="0" hangingPunct="1">
+                  <a:lnSpc>
+                    <a:spcPct val="110000"/>
+                  </a:lnSpc>
+                  <a:spcBef>
+                    <a:spcPts val="500"/>
+                  </a:spcBef>
+                  <a:buFont typeface="Arial" panose="020B0604020202020204" pitchFamily="34" charset="0"/>
+                  <a:buChar char="•"/>
+                  <a:defRPr sz="1200" kern="1200">
+                    <a:solidFill>
+                      <a:schemeClr val="tx1"/>
+                    </a:solidFill>
+                    <a:latin typeface="+mn-lt"/>
+                    <a:ea typeface="+mn-ea"/>
+                    <a:cs typeface="+mn-cs"/>
+                  </a:defRPr>
+                </a:lvl5pPr>
+                <a:lvl6pPr marL="2514600" indent="-228600" algn="l" defTabSz="914400" rtl="0" eaLnBrk="1" latinLnBrk="0" hangingPunct="1">
+                  <a:lnSpc>
+                    <a:spcPct val="90000"/>
+                  </a:lnSpc>
+                  <a:spcBef>
+                    <a:spcPts val="500"/>
+                  </a:spcBef>
+                  <a:buFont typeface="Arial" panose="020B0604020202020204" pitchFamily="34" charset="0"/>
+                  <a:buChar char="•"/>
+                  <a:defRPr sz="1800" kern="1200">
+                    <a:solidFill>
+                      <a:schemeClr val="tx1"/>
+                    </a:solidFill>
+                    <a:latin typeface="+mn-lt"/>
+                    <a:ea typeface="+mn-ea"/>
+                    <a:cs typeface="+mn-cs"/>
+                  </a:defRPr>
+                </a:lvl6pPr>
+                <a:lvl7pPr marL="2971800" indent="-228600" algn="l" defTabSz="914400" rtl="0" eaLnBrk="1" latinLnBrk="0" hangingPunct="1">
+                  <a:lnSpc>
+                    <a:spcPct val="90000"/>
+                  </a:lnSpc>
+                  <a:spcBef>
+                    <a:spcPts val="500"/>
+                  </a:spcBef>
+                  <a:buFont typeface="Arial" panose="020B0604020202020204" pitchFamily="34" charset="0"/>
+                  <a:buChar char="•"/>
+                  <a:defRPr sz="1800" kern="1200">
+                    <a:solidFill>
+                      <a:schemeClr val="tx1"/>
+                    </a:solidFill>
+                    <a:latin typeface="+mn-lt"/>
+                    <a:ea typeface="+mn-ea"/>
+                    <a:cs typeface="+mn-cs"/>
+                  </a:defRPr>
+                </a:lvl7pPr>
+                <a:lvl8pPr marL="3429000" indent="-228600" algn="l" defTabSz="914400" rtl="0" eaLnBrk="1" latinLnBrk="0" hangingPunct="1">
+                  <a:lnSpc>
+                    <a:spcPct val="90000"/>
+                  </a:lnSpc>
+                  <a:spcBef>
+                    <a:spcPts val="500"/>
+                  </a:spcBef>
+                  <a:buFont typeface="Arial" panose="020B0604020202020204" pitchFamily="34" charset="0"/>
+                  <a:buChar char="•"/>
+                  <a:defRPr sz="1800" kern="1200">
+                    <a:solidFill>
+                      <a:schemeClr val="tx1"/>
+                    </a:solidFill>
+                    <a:latin typeface="+mn-lt"/>
+                    <a:ea typeface="+mn-ea"/>
+                    <a:cs typeface="+mn-cs"/>
+                  </a:defRPr>
+                </a:lvl8pPr>
+                <a:lvl9pPr marL="3886200" indent="-228600" algn="l" defTabSz="914400" rtl="0" eaLnBrk="1" latinLnBrk="0" hangingPunct="1">
+                  <a:lnSpc>
+                    <a:spcPct val="90000"/>
+                  </a:lnSpc>
+                  <a:spcBef>
+                    <a:spcPts val="500"/>
+                  </a:spcBef>
+                  <a:buFont typeface="Arial" panose="020B0604020202020204" pitchFamily="34" charset="0"/>
+                  <a:buChar char="•"/>
+                  <a:defRPr sz="1800" kern="1200">
+                    <a:solidFill>
+                      <a:schemeClr val="tx1"/>
+                    </a:solidFill>
+                    <a:latin typeface="+mn-lt"/>
+                    <a:ea typeface="+mn-ea"/>
+                    <a:cs typeface="+mn-cs"/>
+                  </a:defRPr>
+                </a:lvl9pPr>
+              </a:lstStyle>
+              <a:p>
+                <a:pPr marL="0" indent="0">
+                  <a:buNone/>
+                </a:pPr>
+                <a:r>
+                  <a:rPr lang="es-ES" sz="1300" dirty="0"/>
+                  <a:t>Inmaculada Santamaria Valenzuela</a:t>
+                </a:r>
+              </a:p>
+            </p:txBody>
+          </p:sp>
+          <p:pic>
+            <p:nvPicPr>
+              <p:cNvPr id="2056" name="Picture 8">
+                <a:extLst>
+                  <a:ext uri="{FF2B5EF4-FFF2-40B4-BE49-F238E27FC236}">
+                    <a16:creationId xmlns:a16="http://schemas.microsoft.com/office/drawing/2014/main" id="{93820437-8CFD-CFA4-2CB0-25A4399F0C9C}"/>
+                  </a:ext>
+                </a:extLst>
+              </p:cNvPr>
+              <p:cNvPicPr>
+                <a:picLocks noChangeAspect="1" noChangeArrowheads="1"/>
+              </p:cNvPicPr>
+              <p:nvPr/>
+            </p:nvPicPr>
+            <p:blipFill>
+              <a:blip r:embed="rId19">
+                <a:extLst>
+                  <a:ext uri="{28A0092B-C50C-407E-A947-70E740481C1C}">
+                    <a14:useLocalDpi xmlns:a14="http://schemas.microsoft.com/office/drawing/2010/main" val="0"/>
+                  </a:ext>
+                </a:extLst>
+              </a:blip>
+              <a:srcRect/>
+              <a:stretch>
+                <a:fillRect/>
+              </a:stretch>
+            </p:blipFill>
+            <p:spPr bwMode="auto">
+              <a:xfrm>
+                <a:off x="334506" y="4024897"/>
+                <a:ext cx="379150" cy="379150"/>
+              </a:xfrm>
+              <a:prstGeom prst="rect">
+                <a:avLst/>
+              </a:prstGeom>
+              <a:noFill/>
+              <a:extLst>
+                <a:ext uri="{909E8E84-426E-40DD-AFC4-6F175D3DCCD1}">
+                  <a14:hiddenFill xmlns:a14="http://schemas.microsoft.com/office/drawing/2010/main">
+                    <a:solidFill>
+                      <a:srgbClr val="FFFFFF"/>
+                    </a:solidFill>
+                  </a14:hiddenFill>
+                </a:ext>
+              </a:extLst>
+            </p:spPr>
+          </p:pic>
+        </p:grpSp>
+        <p:sp>
+          <p:nvSpPr>
+            <p:cNvPr id="2" name="Content Placeholder 2">
+              <a:extLst>
+                <a:ext uri="{FF2B5EF4-FFF2-40B4-BE49-F238E27FC236}">
+                  <a16:creationId xmlns:a16="http://schemas.microsoft.com/office/drawing/2014/main" id="{6A7B7D32-9656-B93B-9D9F-EA83F43037FD}"/>
+                </a:ext>
+              </a:extLst>
+            </p:cNvPr>
+            <p:cNvSpPr txBox="1">
+              <a:spLocks/>
+            </p:cNvSpPr>
+            <p:nvPr/>
+          </p:nvSpPr>
+          <p:spPr>
+            <a:xfrm>
+              <a:off x="909960" y="4946650"/>
+              <a:ext cx="1851304" cy="297180"/>
+            </a:xfrm>
+            <a:prstGeom prst="rect">
+              <a:avLst/>
+            </a:prstGeom>
+          </p:spPr>
+          <p:txBody>
+            <a:bodyPr vert="horz" lIns="91440" tIns="45720" rIns="91440" bIns="45720" rtlCol="0">
+              <a:noAutofit/>
+            </a:bodyPr>
+            <a:lstStyle>
+              <a:lvl1pPr marL="228600" indent="-228600" algn="l" defTabSz="914400" rtl="0" eaLnBrk="1" latinLnBrk="0" hangingPunct="1">
+                <a:lnSpc>
+                  <a:spcPct val="110000"/>
+                </a:lnSpc>
+                <a:spcBef>
+                  <a:spcPts val="1000"/>
+                </a:spcBef>
+                <a:buFont typeface="Arial" panose="020B0604020202020204" pitchFamily="34" charset="0"/>
+                <a:buChar char="•"/>
+                <a:defRPr sz="1800" kern="1200">
+                  <a:solidFill>
+                    <a:schemeClr val="tx1"/>
+                  </a:solidFill>
+                  <a:latin typeface="+mn-lt"/>
+                  <a:ea typeface="+mn-ea"/>
+                  <a:cs typeface="+mn-cs"/>
+                </a:defRPr>
+              </a:lvl1pPr>
+              <a:lvl2pPr marL="685800" indent="-228600" algn="l" defTabSz="914400" rtl="0" eaLnBrk="1" latinLnBrk="0" hangingPunct="1">
+                <a:lnSpc>
+                  <a:spcPct val="110000"/>
+                </a:lnSpc>
+                <a:spcBef>
+                  <a:spcPts val="500"/>
+                </a:spcBef>
+                <a:buFont typeface="Arial" panose="020B0604020202020204" pitchFamily="34" charset="0"/>
+                <a:buChar char="•"/>
+                <a:defRPr sz="1600" kern="1200">
+                  <a:solidFill>
+                    <a:schemeClr val="tx1"/>
+                  </a:solidFill>
+                  <a:latin typeface="+mn-lt"/>
+                  <a:ea typeface="+mn-ea"/>
+                  <a:cs typeface="+mn-cs"/>
+                </a:defRPr>
+              </a:lvl2pPr>
+              <a:lvl3pPr marL="1143000" indent="-228600" algn="l" defTabSz="914400" rtl="0" eaLnBrk="1" latinLnBrk="0" hangingPunct="1">
+                <a:lnSpc>
+                  <a:spcPct val="110000"/>
+                </a:lnSpc>
+                <a:spcBef>
+                  <a:spcPts val="500"/>
+                </a:spcBef>
+                <a:buFont typeface="Arial" panose="020B0604020202020204" pitchFamily="34" charset="0"/>
+                <a:buChar char="•"/>
+                <a:defRPr sz="1400" kern="1200">
+                  <a:solidFill>
+                    <a:schemeClr val="tx1"/>
+                  </a:solidFill>
+                  <a:latin typeface="+mn-lt"/>
+                  <a:ea typeface="+mn-ea"/>
+                  <a:cs typeface="+mn-cs"/>
+                </a:defRPr>
+              </a:lvl3pPr>
+              <a:lvl4pPr marL="1600200" indent="-228600" algn="l" defTabSz="914400" rtl="0" eaLnBrk="1" latinLnBrk="0" hangingPunct="1">
+                <a:lnSpc>
+                  <a:spcPct val="110000"/>
+                </a:lnSpc>
+                <a:spcBef>
+                  <a:spcPts val="500"/>
+                </a:spcBef>
+                <a:buFont typeface="Arial" panose="020B0604020202020204" pitchFamily="34" charset="0"/>
+                <a:buChar char="•"/>
+                <a:defRPr sz="1200" kern="1200">
+                  <a:solidFill>
+                    <a:schemeClr val="tx1"/>
+                  </a:solidFill>
+                  <a:latin typeface="+mn-lt"/>
+                  <a:ea typeface="+mn-ea"/>
+                  <a:cs typeface="+mn-cs"/>
+                </a:defRPr>
+              </a:lvl4pPr>
+              <a:lvl5pPr marL="2057400" indent="-228600" algn="l" defTabSz="914400" rtl="0" eaLnBrk="1" latinLnBrk="0" hangingPunct="1">
+                <a:lnSpc>
+                  <a:spcPct val="110000"/>
+                </a:lnSpc>
+                <a:spcBef>
+                  <a:spcPts val="500"/>
+                </a:spcBef>
+                <a:buFont typeface="Arial" panose="020B0604020202020204" pitchFamily="34" charset="0"/>
+                <a:buChar char="•"/>
+                <a:defRPr sz="1200" kern="1200">
+                  <a:solidFill>
+                    <a:schemeClr val="tx1"/>
+                  </a:solidFill>
+                  <a:latin typeface="+mn-lt"/>
+                  <a:ea typeface="+mn-ea"/>
+                  <a:cs typeface="+mn-cs"/>
+                </a:defRPr>
+              </a:lvl5pPr>
+              <a:lvl6pPr marL="2514600" indent="-228600" algn="l" defTabSz="914400" rtl="0" eaLnBrk="1" latinLnBrk="0" hangingPunct="1">
+                <a:lnSpc>
+                  <a:spcPct val="90000"/>
+                </a:lnSpc>
+                <a:spcBef>
+                  <a:spcPts val="500"/>
+                </a:spcBef>
+                <a:buFont typeface="Arial" panose="020B0604020202020204" pitchFamily="34" charset="0"/>
+                <a:buChar char="•"/>
+                <a:defRPr sz="1800" kern="1200">
+                  <a:solidFill>
+                    <a:schemeClr val="tx1"/>
+                  </a:solidFill>
+                  <a:latin typeface="+mn-lt"/>
+                  <a:ea typeface="+mn-ea"/>
+                  <a:cs typeface="+mn-cs"/>
+                </a:defRPr>
+              </a:lvl6pPr>
+              <a:lvl7pPr marL="2971800" indent="-228600" algn="l" defTabSz="914400" rtl="0" eaLnBrk="1" latinLnBrk="0" hangingPunct="1">
+                <a:lnSpc>
+                  <a:spcPct val="90000"/>
+                </a:lnSpc>
+                <a:spcBef>
+                  <a:spcPts val="500"/>
+                </a:spcBef>
+                <a:buFont typeface="Arial" panose="020B0604020202020204" pitchFamily="34" charset="0"/>
+                <a:buChar char="•"/>
+                <a:defRPr sz="1800" kern="1200">
+                  <a:solidFill>
+                    <a:schemeClr val="tx1"/>
+                  </a:solidFill>
+                  <a:latin typeface="+mn-lt"/>
+                  <a:ea typeface="+mn-ea"/>
+                  <a:cs typeface="+mn-cs"/>
+                </a:defRPr>
+              </a:lvl7pPr>
+              <a:lvl8pPr marL="3429000" indent="-228600" algn="l" defTabSz="914400" rtl="0" eaLnBrk="1" latinLnBrk="0" hangingPunct="1">
+                <a:lnSpc>
+                  <a:spcPct val="90000"/>
+                </a:lnSpc>
+                <a:spcBef>
+                  <a:spcPts val="500"/>
+                </a:spcBef>
+                <a:buFont typeface="Arial" panose="020B0604020202020204" pitchFamily="34" charset="0"/>
+                <a:buChar char="•"/>
+                <a:defRPr sz="1800" kern="1200">
+                  <a:solidFill>
+                    <a:schemeClr val="tx1"/>
+                  </a:solidFill>
+                  <a:latin typeface="+mn-lt"/>
+                  <a:ea typeface="+mn-ea"/>
+                  <a:cs typeface="+mn-cs"/>
+                </a:defRPr>
+              </a:lvl8pPr>
+              <a:lvl9pPr marL="3886200" indent="-228600" algn="l" defTabSz="914400" rtl="0" eaLnBrk="1" latinLnBrk="0" hangingPunct="1">
+                <a:lnSpc>
+                  <a:spcPct val="90000"/>
+                </a:lnSpc>
+                <a:spcBef>
+                  <a:spcPts val="500"/>
+                </a:spcBef>
+                <a:buFont typeface="Arial" panose="020B0604020202020204" pitchFamily="34" charset="0"/>
+                <a:buChar char="•"/>
+                <a:defRPr sz="1800" kern="1200">
+                  <a:solidFill>
+                    <a:schemeClr val="tx1"/>
+                  </a:solidFill>
+                  <a:latin typeface="+mn-lt"/>
+                  <a:ea typeface="+mn-ea"/>
+                  <a:cs typeface="+mn-cs"/>
+                </a:defRPr>
+              </a:lvl9pPr>
+            </a:lstStyle>
+            <a:p>
+              <a:pPr marL="0" indent="0">
+                <a:buNone/>
+              </a:pPr>
+              <a:r>
+                <a:rPr lang="es-ES" sz="1300" dirty="0"/>
+                <a:t>0000-0002-7497-8795</a:t>
+              </a:r>
+            </a:p>
+          </p:txBody>
+        </p:sp>
+        <p:pic>
+          <p:nvPicPr>
+            <p:cNvPr id="1041" name="Picture 17">
+              <a:extLst>
+                <a:ext uri="{FF2B5EF4-FFF2-40B4-BE49-F238E27FC236}">
+                  <a16:creationId xmlns:a16="http://schemas.microsoft.com/office/drawing/2014/main" id="{71227C70-68DE-2B18-4CCA-A51C21BD9F26}"/>
+                </a:ext>
+              </a:extLst>
+            </p:cNvPr>
+            <p:cNvPicPr>
+              <a:picLocks noChangeAspect="1" noChangeArrowheads="1"/>
+            </p:cNvPicPr>
+            <p:nvPr/>
+          </p:nvPicPr>
+          <p:blipFill>
+            <a:blip r:embed="rId20">
+              <a:extLst>
+                <a:ext uri="{28A0092B-C50C-407E-A947-70E740481C1C}">
+                  <a14:useLocalDpi xmlns:a14="http://schemas.microsoft.com/office/drawing/2010/main" val="0"/>
+                </a:ext>
+              </a:extLst>
+            </a:blip>
+            <a:srcRect/>
+            <a:stretch>
+              <a:fillRect/>
+            </a:stretch>
+          </p:blipFill>
+          <p:spPr bwMode="auto">
+            <a:xfrm>
+              <a:off x="595203" y="4920125"/>
+              <a:ext cx="350230" cy="350230"/>
+            </a:xfrm>
+            <a:prstGeom prst="rect">
+              <a:avLst/>
+            </a:prstGeom>
+            <a:noFill/>
             <a:extLst>
-              <a:ext uri="{FF2B5EF4-FFF2-40B4-BE49-F238E27FC236}">
-                <a16:creationId xmlns:a16="http://schemas.microsoft.com/office/drawing/2014/main" id="{71227C70-68DE-2B18-4CCA-A51C21BD9F26}"/>
+              <a:ext uri="{909E8E84-426E-40DD-AFC4-6F175D3DCCD1}">
+                <a14:hiddenFill xmlns:a14="http://schemas.microsoft.com/office/drawing/2010/main">
+                  <a:solidFill>
+                    <a:srgbClr val="FFFFFF"/>
+                  </a:solidFill>
+                </a14:hiddenFill>
               </a:ext>
             </a:extLst>
-          </p:cNvPr>
-          <p:cNvPicPr>
-            <a:picLocks noChangeAspect="1" noChangeArrowheads="1"/>
-          </p:cNvPicPr>
-          <p:nvPr/>
-        </p:nvPicPr>
-        <p:blipFill>
-          <a:blip r:embed="rId20">
-            <a:extLst>
-              <a:ext uri="{28A0092B-C50C-407E-A947-70E740481C1C}">
-                <a14:useLocalDpi xmlns:a14="http://schemas.microsoft.com/office/drawing/2010/main" val="0"/>
-              </a:ext>
-            </a:extLst>
-          </a:blip>
-          <a:srcRect/>
-          <a:stretch>
-            <a:fillRect/>
-          </a:stretch>
-        </p:blipFill>
-        <p:spPr bwMode="auto">
-          <a:xfrm>
-            <a:off x="595203" y="4920125"/>
-            <a:ext cx="350230" cy="350230"/>
-          </a:xfrm>
-          <a:prstGeom prst="rect">
-            <a:avLst/>
-          </a:prstGeom>
-          <a:noFill/>
-          <a:extLst>
-            <a:ext uri="{909E8E84-426E-40DD-AFC4-6F175D3DCCD1}">
-              <a14:hiddenFill xmlns:a14="http://schemas.microsoft.com/office/drawing/2010/main">
-                <a:solidFill>
-                  <a:srgbClr val="FFFFFF"/>
-                </a:solidFill>
-              </a14:hiddenFill>
-            </a:ext>
-          </a:extLst>
-        </p:spPr>
-      </p:pic>
+          </p:spPr>
+        </p:pic>
+      </p:grpSp>
     </p:spTree>
     <p:extLst>
       <p:ext uri="{BB962C8B-B14F-4D97-AF65-F5344CB8AC3E}">

</xml_diff>

<commit_message>
Corregido enlace en carta de presentación
</commit_message>
<xml_diff>
--- a/TarjetaPresentación.pptx
+++ b/TarjetaPresentación.pptx
@@ -197,7 +197,7 @@
           <a:p>
             <a:fld id="{7E60356A-0530-4333-9A88-1BB7BC2D6415}" type="datetimeFigureOut">
               <a:rPr lang="es-ES" smtClean="0"/>
-              <a:t>04/06/2025</a:t>
+              <a:t>18/06/2025</a:t>
             </a:fld>
             <a:endParaRPr lang="es-ES"/>
           </a:p>
@@ -832,7 +832,7 @@
           <a:p>
             <a:fld id="{E80C50CD-E178-4744-9B35-B2F624D6C5E9}" type="datetimeFigureOut">
               <a:rPr lang="en-US" smtClean="0"/>
-              <a:t>6/4/2025</a:t>
+              <a:t>6/18/2025</a:t>
             </a:fld>
             <a:endParaRPr lang="en-US"/>
           </a:p>
@@ -1030,7 +1030,7 @@
           <a:p>
             <a:fld id="{E80C50CD-E178-4744-9B35-B2F624D6C5E9}" type="datetimeFigureOut">
               <a:rPr lang="en-US" smtClean="0"/>
-              <a:t>6/4/2025</a:t>
+              <a:t>6/18/2025</a:t>
             </a:fld>
             <a:endParaRPr lang="en-US"/>
           </a:p>
@@ -1238,7 +1238,7 @@
           <a:p>
             <a:fld id="{E80C50CD-E178-4744-9B35-B2F624D6C5E9}" type="datetimeFigureOut">
               <a:rPr lang="en-US" smtClean="0"/>
-              <a:t>6/4/2025</a:t>
+              <a:t>6/18/2025</a:t>
             </a:fld>
             <a:endParaRPr lang="en-US"/>
           </a:p>
@@ -1488,7 +1488,7 @@
           <a:p>
             <a:fld id="{E80C50CD-E178-4744-9B35-B2F624D6C5E9}" type="datetimeFigureOut">
               <a:rPr lang="en-US" smtClean="0"/>
-              <a:t>6/4/2025</a:t>
+              <a:t>6/18/2025</a:t>
             </a:fld>
             <a:endParaRPr lang="en-US"/>
           </a:p>
@@ -1767,7 +1767,7 @@
           <a:p>
             <a:fld id="{E80C50CD-E178-4744-9B35-B2F624D6C5E9}" type="datetimeFigureOut">
               <a:rPr lang="en-US" smtClean="0"/>
-              <a:t>6/4/2025</a:t>
+              <a:t>6/18/2025</a:t>
             </a:fld>
             <a:endParaRPr lang="en-US"/>
           </a:p>
@@ -2084,7 +2084,7 @@
           <a:p>
             <a:fld id="{E80C50CD-E178-4744-9B35-B2F624D6C5E9}" type="datetimeFigureOut">
               <a:rPr lang="en-US" smtClean="0"/>
-              <a:t>6/4/2025</a:t>
+              <a:t>6/18/2025</a:t>
             </a:fld>
             <a:endParaRPr lang="en-US"/>
           </a:p>
@@ -2500,7 +2500,7 @@
           <a:p>
             <a:fld id="{E80C50CD-E178-4744-9B35-B2F624D6C5E9}" type="datetimeFigureOut">
               <a:rPr lang="en-US" smtClean="0"/>
-              <a:t>6/4/2025</a:t>
+              <a:t>6/18/2025</a:t>
             </a:fld>
             <a:endParaRPr lang="en-US"/>
           </a:p>
@@ -2641,7 +2641,7 @@
           <a:p>
             <a:fld id="{E80C50CD-E178-4744-9B35-B2F624D6C5E9}" type="datetimeFigureOut">
               <a:rPr lang="en-US" smtClean="0"/>
-              <a:t>6/4/2025</a:t>
+              <a:t>6/18/2025</a:t>
             </a:fld>
             <a:endParaRPr lang="en-US"/>
           </a:p>
@@ -2754,7 +2754,7 @@
           <a:p>
             <a:fld id="{E80C50CD-E178-4744-9B35-B2F624D6C5E9}" type="datetimeFigureOut">
               <a:rPr lang="en-US" smtClean="0"/>
-              <a:t>6/4/2025</a:t>
+              <a:t>6/18/2025</a:t>
             </a:fld>
             <a:endParaRPr lang="en-US"/>
           </a:p>
@@ -3071,7 +3071,7 @@
           <a:p>
             <a:fld id="{E80C50CD-E178-4744-9B35-B2F624D6C5E9}" type="datetimeFigureOut">
               <a:rPr lang="en-US" smtClean="0"/>
-              <a:t>6/4/2025</a:t>
+              <a:t>6/18/2025</a:t>
             </a:fld>
             <a:endParaRPr lang="en-US"/>
           </a:p>
@@ -3363,7 +3363,7 @@
           <a:p>
             <a:fld id="{E80C50CD-E178-4744-9B35-B2F624D6C5E9}" type="datetimeFigureOut">
               <a:rPr lang="en-US" smtClean="0"/>
-              <a:t>6/4/2025</a:t>
+              <a:t>6/18/2025</a:t>
             </a:fld>
             <a:endParaRPr lang="en-US"/>
           </a:p>
@@ -3603,7 +3603,7 @@
             <a:fld id="{E80C50CD-E178-4744-9B35-B2F624D6C5E9}" type="datetimeFigureOut">
               <a:rPr lang="en-US" smtClean="0"/>
               <a:pPr/>
-              <a:t>6/4/2025</a:t>
+              <a:t>6/18/2025</a:t>
             </a:fld>
             <a:endParaRPr lang="en-US"/>
           </a:p>
@@ -5688,7 +5688,23 @@
               </a:r>
               <a:r>
                 <a:rPr lang="es-ES" sz="1400" dirty="0"/>
-                <a:t> https://github.com/misantamaria/deepvats-foundation/tree/paper</a:t>
+                <a:t> </a:t>
+              </a:r>
+              <a:r>
+                <a:rPr lang="es-ES" sz="1400" dirty="0">
+                  <a:hlinkClick r:id="rId7">
+                    <a:extLst>
+                      <a:ext uri="{A12FA001-AC4F-418D-AE19-62706E023703}">
+                        <ahyp:hlinkClr xmlns:ahyp="http://schemas.microsoft.com/office/drawing/2018/hyperlinkcolor" val="tx"/>
+                      </a:ext>
+                    </a:extLst>
+                  </a:hlinkClick>
+                </a:rPr>
+                <a:t>https://github.com/misantamaria/deepvats-foundation/tree/paper</a:t>
+              </a:r>
+              <a:r>
+                <a:rPr lang="es-ES" sz="1400" dirty="0"/>
+                <a:t> </a:t>
               </a:r>
             </a:p>
           </p:txBody>
@@ -5708,7 +5724,7 @@
             <p:nvPr/>
           </p:nvPicPr>
           <p:blipFill>
-            <a:blip r:embed="rId7">
+            <a:blip r:embed="rId8">
               <a:clrChange>
                 <a:clrFrom>
                   <a:srgbClr val="FFFFFF"/>
@@ -5963,7 +5979,7 @@
               </a:r>
               <a:r>
                 <a:rPr lang="es-ES" sz="1400" dirty="0">
-                  <a:hlinkClick r:id="rId8">
+                  <a:hlinkClick r:id="rId9">
                     <a:extLst>
                       <a:ext uri="{A12FA001-AC4F-418D-AE19-62706E023703}">
                         <ahyp:hlinkClr xmlns:ahyp="http://schemas.microsoft.com/office/drawing/2018/hyperlinkcolor" val="tx"/>
@@ -6190,7 +6206,7 @@
             </a:r>
             <a:r>
               <a:rPr lang="es-ES" dirty="0">
-                <a:hlinkClick r:id="rId9">
+                <a:hlinkClick r:id="rId10">
                   <a:extLst>
                     <a:ext uri="{A12FA001-AC4F-418D-AE19-62706E023703}">
                       <ahyp:hlinkClr xmlns:ahyp="http://schemas.microsoft.com/office/drawing/2018/hyperlinkcolor" val="tx"/>
@@ -6619,7 +6635,7 @@
             </a:r>
             <a:r>
               <a:rPr lang="es-ES" sz="1300" dirty="0">
-                <a:hlinkClick r:id="rId10">
+                <a:hlinkClick r:id="rId11">
                   <a:extLst>
                     <a:ext uri="{A12FA001-AC4F-418D-AE19-62706E023703}">
                       <ahyp:hlinkClr xmlns:ahyp="http://schemas.microsoft.com/office/drawing/2018/hyperlinkcolor" val="tx"/>
@@ -6635,7 +6651,7 @@
             </a:r>
             <a:r>
               <a:rPr lang="es-ES" sz="1300" dirty="0">
-                <a:hlinkClick r:id="rId11">
+                <a:hlinkClick r:id="rId12">
                   <a:extLst>
                     <a:ext uri="{A12FA001-AC4F-418D-AE19-62706E023703}">
                       <ahyp:hlinkClr xmlns:ahyp="http://schemas.microsoft.com/office/drawing/2018/hyperlinkcolor" val="tx"/>
@@ -6857,7 +6873,7 @@
             </a:r>
             <a:r>
               <a:rPr lang="es-ES" sz="1300" dirty="0">
-                <a:hlinkClick r:id="rId12">
+                <a:hlinkClick r:id="rId13">
                   <a:extLst>
                     <a:ext uri="{A12FA001-AC4F-418D-AE19-62706E023703}">
                       <ahyp:hlinkClr xmlns:ahyp="http://schemas.microsoft.com/office/drawing/2018/hyperlinkcolor" val="tx"/>
@@ -6873,7 +6889,7 @@
             </a:r>
             <a:r>
               <a:rPr lang="es-ES" sz="1300" dirty="0">
-                <a:hlinkClick r:id="rId13">
+                <a:hlinkClick r:id="rId14">
                   <a:extLst>
                     <a:ext uri="{A12FA001-AC4F-418D-AE19-62706E023703}">
                       <ahyp:hlinkClr xmlns:ahyp="http://schemas.microsoft.com/office/drawing/2018/hyperlinkcolor" val="tx"/>
@@ -7260,7 +7276,7 @@
               </a:r>
               <a:r>
                 <a:rPr lang="es-ES" sz="1400" dirty="0">
-                  <a:hlinkClick r:id="rId14">
+                  <a:hlinkClick r:id="rId15">
                     <a:extLst>
                       <a:ext uri="{A12FA001-AC4F-418D-AE19-62706E023703}">
                         <ahyp:hlinkClr xmlns:ahyp="http://schemas.microsoft.com/office/drawing/2018/hyperlinkcolor" val="tx"/>
@@ -7552,7 +7568,7 @@
                 </a:r>
                 <a:r>
                   <a:rPr lang="es-ES" sz="1400" dirty="0">
-                    <a:hlinkClick r:id="rId15">
+                    <a:hlinkClick r:id="rId16">
                       <a:extLst>
                         <a:ext uri="{A12FA001-AC4F-418D-AE19-62706E023703}">
                           <ahyp:hlinkClr xmlns:ahyp="http://schemas.microsoft.com/office/drawing/2018/hyperlinkcolor" val="tx"/>
@@ -7585,7 +7601,7 @@
             <p:nvPr/>
           </p:nvPicPr>
           <p:blipFill>
-            <a:blip r:embed="rId16">
+            <a:blip r:embed="rId17">
               <a:extLst>
                 <a:ext uri="{28A0092B-C50C-407E-A947-70E740481C1C}">
                   <a14:useLocalDpi xmlns:a14="http://schemas.microsoft.com/office/drawing/2010/main" val="0"/>
@@ -8125,7 +8141,7 @@
               <p:nvPr/>
             </p:nvPicPr>
             <p:blipFill>
-              <a:blip r:embed="rId7">
+              <a:blip r:embed="rId8">
                 <a:clrChange>
                   <a:clrFrom>
                     <a:srgbClr val="FFFFFF"/>
@@ -8182,10 +8198,10 @@
               <p:nvPr/>
             </p:nvPicPr>
             <p:blipFill>
-              <a:blip r:embed="rId17">
+              <a:blip r:embed="rId18">
                 <a:extLst>
                   <a:ext uri="{96DAC541-7B7A-43D3-8B79-37D633B846F1}">
-                    <asvg:svgBlip xmlns:asvg="http://schemas.microsoft.com/office/drawing/2016/SVG/main" r:embed="rId18"/>
+                    <asvg:svgBlip xmlns:asvg="http://schemas.microsoft.com/office/drawing/2016/SVG/main" r:embed="rId19"/>
                   </a:ext>
                 </a:extLst>
               </a:blip>
@@ -8622,7 +8638,7 @@
               <p:nvPr/>
             </p:nvPicPr>
             <p:blipFill>
-              <a:blip r:embed="rId19">
+              <a:blip r:embed="rId20">
                 <a:extLst>
                   <a:ext uri="{28A0092B-C50C-407E-A947-70E740481C1C}">
                     <a14:useLocalDpi xmlns:a14="http://schemas.microsoft.com/office/drawing/2010/main" val="0"/>
@@ -8872,7 +8888,7 @@
             <p:nvPr/>
           </p:nvPicPr>
           <p:blipFill>
-            <a:blip r:embed="rId20">
+            <a:blip r:embed="rId21">
               <a:extLst>
                 <a:ext uri="{28A0092B-C50C-407E-A947-70E740481C1C}">
                   <a14:useLocalDpi xmlns:a14="http://schemas.microsoft.com/office/drawing/2010/main" val="0"/>

</xml_diff>

<commit_message>
presentacion version pdf montada
</commit_message>
<xml_diff>
--- a/TarjetaPresentación.pptx
+++ b/TarjetaPresentación.pptx
@@ -197,7 +197,7 @@
           <a:p>
             <a:fld id="{7E60356A-0530-4333-9A88-1BB7BC2D6415}" type="datetimeFigureOut">
               <a:rPr lang="es-ES" smtClean="0"/>
-              <a:t>18/06/2025</a:t>
+              <a:t>30/06/2025</a:t>
             </a:fld>
             <a:endParaRPr lang="es-ES"/>
           </a:p>
@@ -832,7 +832,7 @@
           <a:p>
             <a:fld id="{E80C50CD-E178-4744-9B35-B2F624D6C5E9}" type="datetimeFigureOut">
               <a:rPr lang="en-US" smtClean="0"/>
-              <a:t>6/18/2025</a:t>
+              <a:t>6/30/2025</a:t>
             </a:fld>
             <a:endParaRPr lang="en-US"/>
           </a:p>
@@ -1030,7 +1030,7 @@
           <a:p>
             <a:fld id="{E80C50CD-E178-4744-9B35-B2F624D6C5E9}" type="datetimeFigureOut">
               <a:rPr lang="en-US" smtClean="0"/>
-              <a:t>6/18/2025</a:t>
+              <a:t>6/30/2025</a:t>
             </a:fld>
             <a:endParaRPr lang="en-US"/>
           </a:p>
@@ -1238,7 +1238,7 @@
           <a:p>
             <a:fld id="{E80C50CD-E178-4744-9B35-B2F624D6C5E9}" type="datetimeFigureOut">
               <a:rPr lang="en-US" smtClean="0"/>
-              <a:t>6/18/2025</a:t>
+              <a:t>6/30/2025</a:t>
             </a:fld>
             <a:endParaRPr lang="en-US"/>
           </a:p>
@@ -1488,7 +1488,7 @@
           <a:p>
             <a:fld id="{E80C50CD-E178-4744-9B35-B2F624D6C5E9}" type="datetimeFigureOut">
               <a:rPr lang="en-US" smtClean="0"/>
-              <a:t>6/18/2025</a:t>
+              <a:t>6/30/2025</a:t>
             </a:fld>
             <a:endParaRPr lang="en-US"/>
           </a:p>
@@ -1767,7 +1767,7 @@
           <a:p>
             <a:fld id="{E80C50CD-E178-4744-9B35-B2F624D6C5E9}" type="datetimeFigureOut">
               <a:rPr lang="en-US" smtClean="0"/>
-              <a:t>6/18/2025</a:t>
+              <a:t>6/30/2025</a:t>
             </a:fld>
             <a:endParaRPr lang="en-US"/>
           </a:p>
@@ -2084,7 +2084,7 @@
           <a:p>
             <a:fld id="{E80C50CD-E178-4744-9B35-B2F624D6C5E9}" type="datetimeFigureOut">
               <a:rPr lang="en-US" smtClean="0"/>
-              <a:t>6/18/2025</a:t>
+              <a:t>6/30/2025</a:t>
             </a:fld>
             <a:endParaRPr lang="en-US"/>
           </a:p>
@@ -2500,7 +2500,7 @@
           <a:p>
             <a:fld id="{E80C50CD-E178-4744-9B35-B2F624D6C5E9}" type="datetimeFigureOut">
               <a:rPr lang="en-US" smtClean="0"/>
-              <a:t>6/18/2025</a:t>
+              <a:t>6/30/2025</a:t>
             </a:fld>
             <a:endParaRPr lang="en-US"/>
           </a:p>
@@ -2641,7 +2641,7 @@
           <a:p>
             <a:fld id="{E80C50CD-E178-4744-9B35-B2F624D6C5E9}" type="datetimeFigureOut">
               <a:rPr lang="en-US" smtClean="0"/>
-              <a:t>6/18/2025</a:t>
+              <a:t>6/30/2025</a:t>
             </a:fld>
             <a:endParaRPr lang="en-US"/>
           </a:p>
@@ -2754,7 +2754,7 @@
           <a:p>
             <a:fld id="{E80C50CD-E178-4744-9B35-B2F624D6C5E9}" type="datetimeFigureOut">
               <a:rPr lang="en-US" smtClean="0"/>
-              <a:t>6/18/2025</a:t>
+              <a:t>6/30/2025</a:t>
             </a:fld>
             <a:endParaRPr lang="en-US"/>
           </a:p>
@@ -3071,7 +3071,7 @@
           <a:p>
             <a:fld id="{E80C50CD-E178-4744-9B35-B2F624D6C5E9}" type="datetimeFigureOut">
               <a:rPr lang="en-US" smtClean="0"/>
-              <a:t>6/18/2025</a:t>
+              <a:t>6/30/2025</a:t>
             </a:fld>
             <a:endParaRPr lang="en-US"/>
           </a:p>
@@ -3363,7 +3363,7 @@
           <a:p>
             <a:fld id="{E80C50CD-E178-4744-9B35-B2F624D6C5E9}" type="datetimeFigureOut">
               <a:rPr lang="en-US" smtClean="0"/>
-              <a:t>6/18/2025</a:t>
+              <a:t>6/30/2025</a:t>
             </a:fld>
             <a:endParaRPr lang="en-US"/>
           </a:p>
@@ -3603,7 +3603,7 @@
             <a:fld id="{E80C50CD-E178-4744-9B35-B2F624D6C5E9}" type="datetimeFigureOut">
               <a:rPr lang="en-US" smtClean="0"/>
               <a:pPr/>
-              <a:t>6/18/2025</a:t>
+              <a:t>6/30/2025</a:t>
             </a:fld>
             <a:endParaRPr lang="en-US"/>
           </a:p>
@@ -6202,7 +6202,7 @@
             </a:r>
             <a:r>
               <a:rPr lang="es-ES" sz="1400" b="1" dirty="0"/>
-              <a:t> – MPLOT - </a:t>
+              <a:t> [Q1] – MPLOT - </a:t>
             </a:r>
             <a:r>
               <a:rPr lang="es-ES" dirty="0">
@@ -6421,7 +6421,7 @@
             </a:pPr>
             <a:r>
               <a:rPr lang="es-ES" sz="1400" b="1" dirty="0"/>
-              <a:t>IJIMAI – MOMENT -</a:t>
+              <a:t>IJIMAI [Q2] – MOMENT -</a:t>
             </a:r>
             <a:r>
               <a:rPr lang="es-ES" sz="1400" dirty="0"/>
@@ -6631,7 +6631,7 @@
             </a:r>
             <a:r>
               <a:rPr lang="es-ES" sz="1300" b="1" dirty="0"/>
-              <a:t> – EPSILOD - </a:t>
+              <a:t> [Q2] – EPSILOD - </a:t>
             </a:r>
             <a:r>
               <a:rPr lang="es-ES" sz="1300" dirty="0">
@@ -6869,7 +6869,7 @@
             </a:r>
             <a:r>
               <a:rPr lang="es-ES" sz="1300" b="1" dirty="0"/>
-              <a:t> – Matrices triangulares - </a:t>
+              <a:t> [Q2] – Matrices triangulares - </a:t>
             </a:r>
             <a:r>
               <a:rPr lang="es-ES" sz="1300" dirty="0">

</xml_diff>